<commit_message>
merge individuals count with daf
</commit_message>
<xml_diff>
--- a/short_genetic_variants/docs/short_indels_v02.pptx
+++ b/short_genetic_variants/docs/short_indels_v02.pptx
@@ -5,21 +5,23 @@
     <p:sldMasterId id="2147483648" r:id="rId1"/>
   </p:sldMasterIdLst>
   <p:notesMasterIdLst>
-    <p:notesMasterId r:id="rId14"/>
+    <p:notesMasterId r:id="rId16"/>
   </p:notesMasterIdLst>
   <p:sldIdLst>
     <p:sldId id="256" r:id="rId2"/>
     <p:sldId id="257" r:id="rId3"/>
-    <p:sldId id="275" r:id="rId4"/>
-    <p:sldId id="299" r:id="rId5"/>
-    <p:sldId id="273" r:id="rId6"/>
-    <p:sldId id="288" r:id="rId7"/>
-    <p:sldId id="298" r:id="rId8"/>
-    <p:sldId id="289" r:id="rId9"/>
-    <p:sldId id="292" r:id="rId10"/>
-    <p:sldId id="293" r:id="rId11"/>
-    <p:sldId id="297" r:id="rId12"/>
-    <p:sldId id="300" r:id="rId13"/>
+    <p:sldId id="301" r:id="rId4"/>
+    <p:sldId id="302" r:id="rId5"/>
+    <p:sldId id="275" r:id="rId6"/>
+    <p:sldId id="299" r:id="rId7"/>
+    <p:sldId id="273" r:id="rId8"/>
+    <p:sldId id="288" r:id="rId9"/>
+    <p:sldId id="298" r:id="rId10"/>
+    <p:sldId id="289" r:id="rId11"/>
+    <p:sldId id="292" r:id="rId12"/>
+    <p:sldId id="293" r:id="rId13"/>
+    <p:sldId id="297" r:id="rId14"/>
+    <p:sldId id="300" r:id="rId15"/>
   </p:sldIdLst>
   <p:sldSz cx="12192000" cy="6858000"/>
   <p:notesSz cx="6858000" cy="9144000"/>
@@ -208,7 +210,7 @@
           <a:p>
             <a:fld id="{ADC703C6-BB32-1847-9BA4-6A93FF920BED}" type="datetimeFigureOut">
               <a:rPr lang="en-GB" smtClean="0"/>
-              <a:t>04/08/2020</a:t>
+              <a:t>24/08/2020</a:t>
             </a:fld>
             <a:endParaRPr lang="en-GB"/>
           </a:p>
@@ -541,7 +543,7 @@
           <a:p>
             <a:fld id="{2ADA2D0F-F41E-7742-88B9-1534E3544B0B}" type="slidenum">
               <a:rPr lang="en-GB" smtClean="0"/>
-              <a:t>5</a:t>
+              <a:t>7</a:t>
             </a:fld>
             <a:endParaRPr lang="en-GB"/>
           </a:p>
@@ -709,7 +711,7 @@
           <a:p>
             <a:fld id="{5C316670-22DA-CE45-BF19-C0B19D676291}" type="datetimeFigureOut">
               <a:rPr lang="en-GB" smtClean="0"/>
-              <a:t>04/08/2020</a:t>
+              <a:t>24/08/2020</a:t>
             </a:fld>
             <a:endParaRPr lang="en-GB"/>
           </a:p>
@@ -909,7 +911,7 @@
           <a:p>
             <a:fld id="{5C316670-22DA-CE45-BF19-C0B19D676291}" type="datetimeFigureOut">
               <a:rPr lang="en-GB" smtClean="0"/>
-              <a:t>04/08/2020</a:t>
+              <a:t>24/08/2020</a:t>
             </a:fld>
             <a:endParaRPr lang="en-GB"/>
           </a:p>
@@ -1119,7 +1121,7 @@
           <a:p>
             <a:fld id="{5C316670-22DA-CE45-BF19-C0B19D676291}" type="datetimeFigureOut">
               <a:rPr lang="en-GB" smtClean="0"/>
-              <a:t>04/08/2020</a:t>
+              <a:t>24/08/2020</a:t>
             </a:fld>
             <a:endParaRPr lang="en-GB"/>
           </a:p>
@@ -1319,7 +1321,7 @@
           <a:p>
             <a:fld id="{5C316670-22DA-CE45-BF19-C0B19D676291}" type="datetimeFigureOut">
               <a:rPr lang="en-GB" smtClean="0"/>
-              <a:t>04/08/2020</a:t>
+              <a:t>24/08/2020</a:t>
             </a:fld>
             <a:endParaRPr lang="en-GB"/>
           </a:p>
@@ -1595,7 +1597,7 @@
           <a:p>
             <a:fld id="{5C316670-22DA-CE45-BF19-C0B19D676291}" type="datetimeFigureOut">
               <a:rPr lang="en-GB" smtClean="0"/>
-              <a:t>04/08/2020</a:t>
+              <a:t>24/08/2020</a:t>
             </a:fld>
             <a:endParaRPr lang="en-GB"/>
           </a:p>
@@ -1863,7 +1865,7 @@
           <a:p>
             <a:fld id="{5C316670-22DA-CE45-BF19-C0B19D676291}" type="datetimeFigureOut">
               <a:rPr lang="en-GB" smtClean="0"/>
-              <a:t>04/08/2020</a:t>
+              <a:t>24/08/2020</a:t>
             </a:fld>
             <a:endParaRPr lang="en-GB"/>
           </a:p>
@@ -2278,7 +2280,7 @@
           <a:p>
             <a:fld id="{5C316670-22DA-CE45-BF19-C0B19D676291}" type="datetimeFigureOut">
               <a:rPr lang="en-GB" smtClean="0"/>
-              <a:t>04/08/2020</a:t>
+              <a:t>24/08/2020</a:t>
             </a:fld>
             <a:endParaRPr lang="en-GB"/>
           </a:p>
@@ -2420,7 +2422,7 @@
           <a:p>
             <a:fld id="{5C316670-22DA-CE45-BF19-C0B19D676291}" type="datetimeFigureOut">
               <a:rPr lang="en-GB" smtClean="0"/>
-              <a:t>04/08/2020</a:t>
+              <a:t>24/08/2020</a:t>
             </a:fld>
             <a:endParaRPr lang="en-GB"/>
           </a:p>
@@ -2533,7 +2535,7 @@
           <a:p>
             <a:fld id="{5C316670-22DA-CE45-BF19-C0B19D676291}" type="datetimeFigureOut">
               <a:rPr lang="en-GB" smtClean="0"/>
-              <a:t>04/08/2020</a:t>
+              <a:t>24/08/2020</a:t>
             </a:fld>
             <a:endParaRPr lang="en-GB"/>
           </a:p>
@@ -2846,7 +2848,7 @@
           <a:p>
             <a:fld id="{5C316670-22DA-CE45-BF19-C0B19D676291}" type="datetimeFigureOut">
               <a:rPr lang="en-GB" smtClean="0"/>
-              <a:t>04/08/2020</a:t>
+              <a:t>24/08/2020</a:t>
             </a:fld>
             <a:endParaRPr lang="en-GB"/>
           </a:p>
@@ -3135,7 +3137,7 @@
           <a:p>
             <a:fld id="{5C316670-22DA-CE45-BF19-C0B19D676291}" type="datetimeFigureOut">
               <a:rPr lang="en-GB" smtClean="0"/>
-              <a:t>04/08/2020</a:t>
+              <a:t>24/08/2020</a:t>
             </a:fld>
             <a:endParaRPr lang="en-GB"/>
           </a:p>
@@ -3378,7 +3380,7 @@
           <a:p>
             <a:fld id="{5C316670-22DA-CE45-BF19-C0B19D676291}" type="datetimeFigureOut">
               <a:rPr lang="en-GB" smtClean="0"/>
-              <a:t>04/08/2020</a:t>
+              <a:t>24/08/2020</a:t>
             </a:fld>
             <a:endParaRPr lang="en-GB"/>
           </a:p>
@@ -3857,6 +3859,126 @@
       </p:grpSpPr>
       <p:pic>
         <p:nvPicPr>
+          <p:cNvPr id="9" name="Picture 8">
+            <a:extLst>
+              <a:ext uri="{FF2B5EF4-FFF2-40B4-BE49-F238E27FC236}">
+                <a16:creationId xmlns:a16="http://schemas.microsoft.com/office/drawing/2014/main" id="{813F0727-7F5F-E947-AB1A-33BFBA8C725F}"/>
+              </a:ext>
+            </a:extLst>
+          </p:cNvPr>
+          <p:cNvPicPr>
+            <a:picLocks noChangeAspect="1"/>
+          </p:cNvPicPr>
+          <p:nvPr/>
+        </p:nvPicPr>
+        <p:blipFill>
+          <a:blip r:embed="rId2"/>
+          <a:stretch>
+            <a:fillRect/>
+          </a:stretch>
+        </p:blipFill>
+        <p:spPr>
+          <a:xfrm>
+            <a:off x="1130045" y="0"/>
+            <a:ext cx="9931910" cy="6858000"/>
+          </a:xfrm>
+          <a:prstGeom prst="rect">
+            <a:avLst/>
+          </a:prstGeom>
+        </p:spPr>
+      </p:pic>
+    </p:spTree>
+    <p:extLst>
+      <p:ext uri="{BB962C8B-B14F-4D97-AF65-F5344CB8AC3E}">
+        <p14:creationId xmlns:p14="http://schemas.microsoft.com/office/powerpoint/2010/main" val="3369321309"/>
+      </p:ext>
+    </p:extLst>
+  </p:cSld>
+  <p:clrMapOvr>
+    <a:masterClrMapping/>
+  </p:clrMapOvr>
+</p:sld>
+</file>
+
+<file path=ppt/slides/slide11.xml><?xml version="1.0" encoding="utf-8"?>
+<p:sld xmlns:a="http://schemas.openxmlformats.org/drawingml/2006/main" xmlns:r="http://schemas.openxmlformats.org/officeDocument/2006/relationships" xmlns:p="http://schemas.openxmlformats.org/presentationml/2006/main">
+  <p:cSld>
+    <p:spTree>
+      <p:nvGrpSpPr>
+        <p:cNvPr id="1" name=""/>
+        <p:cNvGrpSpPr/>
+        <p:nvPr/>
+      </p:nvGrpSpPr>
+      <p:grpSpPr>
+        <a:xfrm>
+          <a:off x="0" y="0"/>
+          <a:ext cx="0" cy="0"/>
+          <a:chOff x="0" y="0"/>
+          <a:chExt cx="0" cy="0"/>
+        </a:xfrm>
+      </p:grpSpPr>
+      <p:pic>
+        <p:nvPicPr>
+          <p:cNvPr id="8" name="Picture 7">
+            <a:extLst>
+              <a:ext uri="{FF2B5EF4-FFF2-40B4-BE49-F238E27FC236}">
+                <a16:creationId xmlns:a16="http://schemas.microsoft.com/office/drawing/2014/main" id="{42B4020A-CDB6-5243-ACC8-3BBF9A1D305B}"/>
+              </a:ext>
+            </a:extLst>
+          </p:cNvPr>
+          <p:cNvPicPr>
+            <a:picLocks noChangeAspect="1"/>
+          </p:cNvPicPr>
+          <p:nvPr/>
+        </p:nvPicPr>
+        <p:blipFill>
+          <a:blip r:embed="rId2"/>
+          <a:stretch>
+            <a:fillRect/>
+          </a:stretch>
+        </p:blipFill>
+        <p:spPr>
+          <a:xfrm>
+            <a:off x="1130045" y="0"/>
+            <a:ext cx="9931910" cy="6858000"/>
+          </a:xfrm>
+          <a:prstGeom prst="rect">
+            <a:avLst/>
+          </a:prstGeom>
+        </p:spPr>
+      </p:pic>
+    </p:spTree>
+    <p:extLst>
+      <p:ext uri="{BB962C8B-B14F-4D97-AF65-F5344CB8AC3E}">
+        <p14:creationId xmlns:p14="http://schemas.microsoft.com/office/powerpoint/2010/main" val="2205415152"/>
+      </p:ext>
+    </p:extLst>
+  </p:cSld>
+  <p:clrMapOvr>
+    <a:masterClrMapping/>
+  </p:clrMapOvr>
+</p:sld>
+</file>
+
+<file path=ppt/slides/slide12.xml><?xml version="1.0" encoding="utf-8"?>
+<p:sld xmlns:a="http://schemas.openxmlformats.org/drawingml/2006/main" xmlns:r="http://schemas.openxmlformats.org/officeDocument/2006/relationships" xmlns:p="http://schemas.openxmlformats.org/presentationml/2006/main">
+  <p:cSld>
+    <p:spTree>
+      <p:nvGrpSpPr>
+        <p:cNvPr id="1" name=""/>
+        <p:cNvGrpSpPr/>
+        <p:nvPr/>
+      </p:nvGrpSpPr>
+      <p:grpSpPr>
+        <a:xfrm>
+          <a:off x="0" y="0"/>
+          <a:ext cx="0" cy="0"/>
+          <a:chOff x="0" y="0"/>
+          <a:chExt cx="0" cy="0"/>
+        </a:xfrm>
+      </p:grpSpPr>
+      <p:pic>
+        <p:nvPicPr>
           <p:cNvPr id="6" name="Picture 5">
             <a:extLst>
               <a:ext uri="{FF2B5EF4-FFF2-40B4-BE49-F238E27FC236}">
@@ -3898,7 +4020,7 @@
 </p:sld>
 </file>
 
-<file path=ppt/slides/slide11.xml><?xml version="1.0" encoding="utf-8"?>
+<file path=ppt/slides/slide13.xml><?xml version="1.0" encoding="utf-8"?>
 <p:sld xmlns:a="http://schemas.openxmlformats.org/drawingml/2006/main" xmlns:r="http://schemas.openxmlformats.org/officeDocument/2006/relationships" xmlns:p="http://schemas.openxmlformats.org/presentationml/2006/main">
   <p:cSld>
     <p:bg>
@@ -4103,7 +4225,7 @@
 </p:sld>
 </file>
 
-<file path=ppt/slides/slide12.xml><?xml version="1.0" encoding="utf-8"?>
+<file path=ppt/slides/slide14.xml><?xml version="1.0" encoding="utf-8"?>
 <p:sld xmlns:a="http://schemas.openxmlformats.org/drawingml/2006/main" xmlns:r="http://schemas.openxmlformats.org/officeDocument/2006/relationships" xmlns:p="http://schemas.openxmlformats.org/presentationml/2006/main">
   <p:cSld>
     <p:bg>
@@ -4408,6 +4530,403 @@
 </file>
 
 <file path=ppt/slides/slide3.xml><?xml version="1.0" encoding="utf-8"?>
+<p:sld xmlns:a="http://schemas.openxmlformats.org/drawingml/2006/main" xmlns:r="http://schemas.openxmlformats.org/officeDocument/2006/relationships" xmlns:p="http://schemas.openxmlformats.org/presentationml/2006/main">
+  <p:cSld>
+    <p:spTree>
+      <p:nvGrpSpPr>
+        <p:cNvPr id="1" name=""/>
+        <p:cNvGrpSpPr/>
+        <p:nvPr/>
+      </p:nvGrpSpPr>
+      <p:grpSpPr>
+        <a:xfrm>
+          <a:off x="0" y="0"/>
+          <a:ext cx="0" cy="0"/>
+          <a:chOff x="0" y="0"/>
+          <a:chExt cx="0" cy="0"/>
+        </a:xfrm>
+      </p:grpSpPr>
+      <p:pic>
+        <p:nvPicPr>
+          <p:cNvPr id="6" name="Picture 5">
+            <a:extLst>
+              <a:ext uri="{FF2B5EF4-FFF2-40B4-BE49-F238E27FC236}">
+                <a16:creationId xmlns:a16="http://schemas.microsoft.com/office/drawing/2014/main" id="{55C94907-3C55-8F4F-AFAD-76D22D98602A}"/>
+              </a:ext>
+            </a:extLst>
+          </p:cNvPr>
+          <p:cNvPicPr>
+            <a:picLocks noChangeAspect="1"/>
+          </p:cNvPicPr>
+          <p:nvPr/>
+        </p:nvPicPr>
+        <p:blipFill>
+          <a:blip r:embed="rId2"/>
+          <a:stretch>
+            <a:fillRect/>
+          </a:stretch>
+        </p:blipFill>
+        <p:spPr>
+          <a:xfrm>
+            <a:off x="1631950" y="342900"/>
+            <a:ext cx="8928100" cy="6172200"/>
+          </a:xfrm>
+          <a:prstGeom prst="rect">
+            <a:avLst/>
+          </a:prstGeom>
+        </p:spPr>
+      </p:pic>
+      <p:sp>
+        <p:nvSpPr>
+          <p:cNvPr id="7" name="Rectangle 6">
+            <a:extLst>
+              <a:ext uri="{FF2B5EF4-FFF2-40B4-BE49-F238E27FC236}">
+                <a16:creationId xmlns:a16="http://schemas.microsoft.com/office/drawing/2014/main" id="{A8D2AC74-9C08-904B-A6DF-4BE10C6CF2CD}"/>
+              </a:ext>
+            </a:extLst>
+          </p:cNvPr>
+          <p:cNvSpPr/>
+          <p:nvPr/>
+        </p:nvSpPr>
+        <p:spPr>
+          <a:xfrm>
+            <a:off x="2166257" y="1338943"/>
+            <a:ext cx="8098972" cy="396000"/>
+          </a:xfrm>
+          <a:prstGeom prst="rect">
+            <a:avLst/>
+          </a:prstGeom>
+          <a:noFill/>
+          <a:ln w="38100">
+            <a:solidFill>
+              <a:srgbClr val="FF0000"/>
+            </a:solidFill>
+          </a:ln>
+        </p:spPr>
+        <p:style>
+          <a:lnRef idx="2">
+            <a:schemeClr val="accent1">
+              <a:shade val="50000"/>
+            </a:schemeClr>
+          </a:lnRef>
+          <a:fillRef idx="1">
+            <a:schemeClr val="accent1"/>
+          </a:fillRef>
+          <a:effectRef idx="0">
+            <a:schemeClr val="accent1"/>
+          </a:effectRef>
+          <a:fontRef idx="minor">
+            <a:schemeClr val="lt1"/>
+          </a:fontRef>
+        </p:style>
+        <p:txBody>
+          <a:bodyPr rtlCol="0" anchor="ctr"/>
+          <a:lstStyle/>
+          <a:p>
+            <a:pPr algn="ctr"/>
+            <a:endParaRPr lang="en-GB"/>
+          </a:p>
+        </p:txBody>
+      </p:sp>
+      <p:sp>
+        <p:nvSpPr>
+          <p:cNvPr id="8" name="Rectangle 7">
+            <a:extLst>
+              <a:ext uri="{FF2B5EF4-FFF2-40B4-BE49-F238E27FC236}">
+                <a16:creationId xmlns:a16="http://schemas.microsoft.com/office/drawing/2014/main" id="{C4737C90-FDBF-A54A-8528-1D17F933391D}"/>
+              </a:ext>
+            </a:extLst>
+          </p:cNvPr>
+          <p:cNvSpPr/>
+          <p:nvPr/>
+        </p:nvSpPr>
+        <p:spPr>
+          <a:xfrm>
+            <a:off x="2166257" y="3271159"/>
+            <a:ext cx="8098972" cy="396000"/>
+          </a:xfrm>
+          <a:prstGeom prst="rect">
+            <a:avLst/>
+          </a:prstGeom>
+          <a:noFill/>
+          <a:ln w="38100">
+            <a:solidFill>
+              <a:srgbClr val="FF0000"/>
+            </a:solidFill>
+          </a:ln>
+        </p:spPr>
+        <p:style>
+          <a:lnRef idx="2">
+            <a:schemeClr val="accent1">
+              <a:shade val="50000"/>
+            </a:schemeClr>
+          </a:lnRef>
+          <a:fillRef idx="1">
+            <a:schemeClr val="accent1"/>
+          </a:fillRef>
+          <a:effectRef idx="0">
+            <a:schemeClr val="accent1"/>
+          </a:effectRef>
+          <a:fontRef idx="minor">
+            <a:schemeClr val="lt1"/>
+          </a:fontRef>
+        </p:style>
+        <p:txBody>
+          <a:bodyPr rtlCol="0" anchor="ctr"/>
+          <a:lstStyle/>
+          <a:p>
+            <a:pPr algn="ctr"/>
+            <a:endParaRPr lang="en-GB"/>
+          </a:p>
+        </p:txBody>
+      </p:sp>
+      <p:sp>
+        <p:nvSpPr>
+          <p:cNvPr id="9" name="Rectangle 8">
+            <a:extLst>
+              <a:ext uri="{FF2B5EF4-FFF2-40B4-BE49-F238E27FC236}">
+                <a16:creationId xmlns:a16="http://schemas.microsoft.com/office/drawing/2014/main" id="{D47DB824-3D7C-0C43-9AD1-E17F69EF721F}"/>
+              </a:ext>
+            </a:extLst>
+          </p:cNvPr>
+          <p:cNvSpPr/>
+          <p:nvPr/>
+        </p:nvSpPr>
+        <p:spPr>
+          <a:xfrm>
+            <a:off x="2166257" y="5203374"/>
+            <a:ext cx="8098972" cy="396000"/>
+          </a:xfrm>
+          <a:prstGeom prst="rect">
+            <a:avLst/>
+          </a:prstGeom>
+          <a:noFill/>
+          <a:ln w="38100">
+            <a:solidFill>
+              <a:srgbClr val="FF0000"/>
+            </a:solidFill>
+          </a:ln>
+        </p:spPr>
+        <p:style>
+          <a:lnRef idx="2">
+            <a:schemeClr val="accent1">
+              <a:shade val="50000"/>
+            </a:schemeClr>
+          </a:lnRef>
+          <a:fillRef idx="1">
+            <a:schemeClr val="accent1"/>
+          </a:fillRef>
+          <a:effectRef idx="0">
+            <a:schemeClr val="accent1"/>
+          </a:effectRef>
+          <a:fontRef idx="minor">
+            <a:schemeClr val="lt1"/>
+          </a:fontRef>
+        </p:style>
+        <p:txBody>
+          <a:bodyPr rtlCol="0" anchor="ctr"/>
+          <a:lstStyle/>
+          <a:p>
+            <a:pPr algn="ctr"/>
+            <a:endParaRPr lang="en-GB"/>
+          </a:p>
+        </p:txBody>
+      </p:sp>
+    </p:spTree>
+    <p:extLst>
+      <p:ext uri="{BB962C8B-B14F-4D97-AF65-F5344CB8AC3E}">
+        <p14:creationId xmlns:p14="http://schemas.microsoft.com/office/powerpoint/2010/main" val="3385532744"/>
+      </p:ext>
+    </p:extLst>
+  </p:cSld>
+  <p:clrMapOvr>
+    <a:masterClrMapping/>
+  </p:clrMapOvr>
+</p:sld>
+</file>
+
+<file path=ppt/slides/slide4.xml><?xml version="1.0" encoding="utf-8"?>
+<p:sld xmlns:a="http://schemas.openxmlformats.org/drawingml/2006/main" xmlns:r="http://schemas.openxmlformats.org/officeDocument/2006/relationships" xmlns:p="http://schemas.openxmlformats.org/presentationml/2006/main">
+  <p:cSld>
+    <p:spTree>
+      <p:nvGrpSpPr>
+        <p:cNvPr id="1" name=""/>
+        <p:cNvGrpSpPr/>
+        <p:nvPr/>
+      </p:nvGrpSpPr>
+      <p:grpSpPr>
+        <a:xfrm>
+          <a:off x="0" y="0"/>
+          <a:ext cx="0" cy="0"/>
+          <a:chOff x="0" y="0"/>
+          <a:chExt cx="0" cy="0"/>
+        </a:xfrm>
+      </p:grpSpPr>
+      <p:pic>
+        <p:nvPicPr>
+          <p:cNvPr id="3" name="Picture 2">
+            <a:extLst>
+              <a:ext uri="{FF2B5EF4-FFF2-40B4-BE49-F238E27FC236}">
+                <a16:creationId xmlns:a16="http://schemas.microsoft.com/office/drawing/2014/main" id="{473488A9-9024-294F-BC6D-2BE50DD98EB6}"/>
+              </a:ext>
+            </a:extLst>
+          </p:cNvPr>
+          <p:cNvPicPr>
+            <a:picLocks noChangeAspect="1"/>
+          </p:cNvPicPr>
+          <p:nvPr/>
+        </p:nvPicPr>
+        <p:blipFill rotWithShape="1">
+          <a:blip r:embed="rId2"/>
+          <a:srcRect r="14641"/>
+          <a:stretch/>
+        </p:blipFill>
+        <p:spPr>
+          <a:xfrm>
+            <a:off x="1631950" y="342900"/>
+            <a:ext cx="7620907" cy="6172200"/>
+          </a:xfrm>
+          <a:prstGeom prst="rect">
+            <a:avLst/>
+          </a:prstGeom>
+        </p:spPr>
+      </p:pic>
+      <p:sp>
+        <p:nvSpPr>
+          <p:cNvPr id="4" name="Oval 3">
+            <a:extLst>
+              <a:ext uri="{FF2B5EF4-FFF2-40B4-BE49-F238E27FC236}">
+                <a16:creationId xmlns:a16="http://schemas.microsoft.com/office/drawing/2014/main" id="{316832BC-C9C0-1643-BC0B-331B62B57C18}"/>
+              </a:ext>
+            </a:extLst>
+          </p:cNvPr>
+          <p:cNvSpPr/>
+          <p:nvPr/>
+        </p:nvSpPr>
+        <p:spPr>
+          <a:xfrm>
+            <a:off x="7043059" y="342900"/>
+            <a:ext cx="1861457" cy="1050471"/>
+          </a:xfrm>
+          <a:prstGeom prst="ellipse">
+            <a:avLst/>
+          </a:prstGeom>
+          <a:noFill/>
+          <a:ln w="38100">
+            <a:solidFill>
+              <a:srgbClr val="619CFF"/>
+            </a:solidFill>
+          </a:ln>
+        </p:spPr>
+        <p:style>
+          <a:lnRef idx="2">
+            <a:schemeClr val="accent1">
+              <a:shade val="50000"/>
+            </a:schemeClr>
+          </a:lnRef>
+          <a:fillRef idx="1">
+            <a:schemeClr val="accent1"/>
+          </a:fillRef>
+          <a:effectRef idx="0">
+            <a:schemeClr val="accent1"/>
+          </a:effectRef>
+          <a:fontRef idx="minor">
+            <a:schemeClr val="lt1"/>
+          </a:fontRef>
+        </p:style>
+        <p:txBody>
+          <a:bodyPr rtlCol="0" anchor="ctr"/>
+          <a:lstStyle/>
+          <a:p>
+            <a:pPr algn="ctr"/>
+            <a:endParaRPr lang="en-GB"/>
+          </a:p>
+        </p:txBody>
+      </p:sp>
+      <p:sp>
+        <p:nvSpPr>
+          <p:cNvPr id="5" name="TextBox 4">
+            <a:extLst>
+              <a:ext uri="{FF2B5EF4-FFF2-40B4-BE49-F238E27FC236}">
+                <a16:creationId xmlns:a16="http://schemas.microsoft.com/office/drawing/2014/main" id="{2B72C4DF-E662-E244-9975-B9154081A09E}"/>
+              </a:ext>
+            </a:extLst>
+          </p:cNvPr>
+          <p:cNvSpPr txBox="1"/>
+          <p:nvPr/>
+        </p:nvSpPr>
+        <p:spPr>
+          <a:xfrm>
+            <a:off x="9252857" y="342900"/>
+            <a:ext cx="2286000" cy="4524315"/>
+          </a:xfrm>
+          <a:prstGeom prst="rect">
+            <a:avLst/>
+          </a:prstGeom>
+          <a:noFill/>
+        </p:spPr>
+        <p:txBody>
+          <a:bodyPr wrap="square" rtlCol="0">
+            <a:spAutoFit/>
+          </a:bodyPr>
+          <a:lstStyle/>
+          <a:p>
+            <a:r>
+              <a:rPr lang="en-GB" dirty="0"/>
+              <a:t>In CZA WAVE RIGHT there are 23 individuals.</a:t>
+            </a:r>
+          </a:p>
+          <a:p>
+            <a:endParaRPr lang="en-GB" dirty="0"/>
+          </a:p>
+          <a:p>
+            <a:r>
+              <a:rPr lang="en-GB" dirty="0"/>
+              <a:t>Using a filter of 20 individuals per variants, the numbers of polymorphic variants are:</a:t>
+            </a:r>
+          </a:p>
+          <a:p>
+            <a:r>
+              <a:rPr lang="en-GB" dirty="0"/>
+              <a:t>20000 INDELs.</a:t>
+            </a:r>
+          </a:p>
+          <a:p>
+            <a:r>
+              <a:rPr lang="en-GB" dirty="0"/>
+              <a:t>89745 SNPs.</a:t>
+            </a:r>
+          </a:p>
+          <a:p>
+            <a:endParaRPr lang="en-GB" dirty="0"/>
+          </a:p>
+          <a:p>
+            <a:r>
+              <a:rPr lang="en-GB" dirty="0"/>
+              <a:t>These numbers have changed very little. INDELs are five less and </a:t>
+            </a:r>
+            <a:r>
+              <a:rPr lang="en-GB"/>
+              <a:t>SNPs are 25 less.</a:t>
+            </a:r>
+            <a:endParaRPr lang="en-GB" dirty="0"/>
+          </a:p>
+        </p:txBody>
+      </p:sp>
+    </p:spTree>
+    <p:extLst>
+      <p:ext uri="{BB962C8B-B14F-4D97-AF65-F5344CB8AC3E}">
+        <p14:creationId xmlns:p14="http://schemas.microsoft.com/office/powerpoint/2010/main" val="2478824910"/>
+      </p:ext>
+    </p:extLst>
+  </p:cSld>
+  <p:clrMapOvr>
+    <a:masterClrMapping/>
+  </p:clrMapOvr>
+</p:sld>
+</file>
+
+<file path=ppt/slides/slide5.xml><?xml version="1.0" encoding="utf-8"?>
 <p:sld xmlns:a="http://schemas.openxmlformats.org/drawingml/2006/main" xmlns:r="http://schemas.openxmlformats.org/officeDocument/2006/relationships" xmlns:p="http://schemas.openxmlformats.org/presentationml/2006/main">
   <p:cSld>
     <p:spTree>
@@ -5124,7 +5643,7 @@
 </p:sld>
 </file>
 
-<file path=ppt/slides/slide4.xml><?xml version="1.0" encoding="utf-8"?>
+<file path=ppt/slides/slide6.xml><?xml version="1.0" encoding="utf-8"?>
 <p:sld xmlns:a="http://schemas.openxmlformats.org/drawingml/2006/main" xmlns:r="http://schemas.openxmlformats.org/officeDocument/2006/relationships" xmlns:p="http://schemas.openxmlformats.org/presentationml/2006/main">
   <p:cSld>
     <p:spTree>
@@ -5834,7 +6353,7 @@
 </p:sld>
 </file>
 
-<file path=ppt/slides/slide5.xml><?xml version="1.0" encoding="utf-8"?>
+<file path=ppt/slides/slide7.xml><?xml version="1.0" encoding="utf-8"?>
 <p:sld xmlns:a="http://schemas.openxmlformats.org/drawingml/2006/main" xmlns:r="http://schemas.openxmlformats.org/officeDocument/2006/relationships" xmlns:p="http://schemas.openxmlformats.org/presentationml/2006/main">
   <p:cSld>
     <p:spTree>
@@ -7685,7 +8204,7 @@
 </p:sld>
 </file>
 
-<file path=ppt/slides/slide6.xml><?xml version="1.0" encoding="utf-8"?>
+<file path=ppt/slides/slide8.xml><?xml version="1.0" encoding="utf-8"?>
 <p:sld xmlns:a="http://schemas.openxmlformats.org/drawingml/2006/main" xmlns:r="http://schemas.openxmlformats.org/officeDocument/2006/relationships" xmlns:p="http://schemas.openxmlformats.org/presentationml/2006/main">
   <p:cSld>
     <p:spTree>
@@ -7938,328 +8457,6 @@
     <p:extLst>
       <p:ext uri="{BB962C8B-B14F-4D97-AF65-F5344CB8AC3E}">
         <p14:creationId xmlns:p14="http://schemas.microsoft.com/office/powerpoint/2010/main" val="2887222785"/>
-      </p:ext>
-    </p:extLst>
-  </p:cSld>
-  <p:clrMapOvr>
-    <a:masterClrMapping/>
-  </p:clrMapOvr>
-</p:sld>
-</file>
-
-<file path=ppt/slides/slide7.xml><?xml version="1.0" encoding="utf-8"?>
-<p:sld xmlns:a="http://schemas.openxmlformats.org/drawingml/2006/main" xmlns:r="http://schemas.openxmlformats.org/officeDocument/2006/relationships" xmlns:p="http://schemas.openxmlformats.org/presentationml/2006/main">
-  <p:cSld>
-    <p:spTree>
-      <p:nvGrpSpPr>
-        <p:cNvPr id="1" name=""/>
-        <p:cNvGrpSpPr/>
-        <p:nvPr/>
-      </p:nvGrpSpPr>
-      <p:grpSpPr>
-        <a:xfrm>
-          <a:off x="0" y="0"/>
-          <a:ext cx="0" cy="0"/>
-          <a:chOff x="0" y="0"/>
-          <a:chExt cx="0" cy="0"/>
-        </a:xfrm>
-      </p:grpSpPr>
-      <p:sp>
-        <p:nvSpPr>
-          <p:cNvPr id="5" name="TextBox 4">
-            <a:extLst>
-              <a:ext uri="{FF2B5EF4-FFF2-40B4-BE49-F238E27FC236}">
-                <a16:creationId xmlns:a16="http://schemas.microsoft.com/office/drawing/2014/main" id="{049B477E-5E39-F240-86CA-65F077DF0726}"/>
-              </a:ext>
-            </a:extLst>
-          </p:cNvPr>
-          <p:cNvSpPr txBox="1"/>
-          <p:nvPr/>
-        </p:nvSpPr>
-        <p:spPr>
-          <a:xfrm>
-            <a:off x="528115" y="1100078"/>
-            <a:ext cx="4043885" cy="923330"/>
-          </a:xfrm>
-          <a:prstGeom prst="rect">
-            <a:avLst/>
-          </a:prstGeom>
-          <a:noFill/>
-        </p:spPr>
-        <p:txBody>
-          <a:bodyPr wrap="square" rtlCol="0">
-            <a:spAutoFit/>
-          </a:bodyPr>
-          <a:lstStyle/>
-          <a:p>
-            <a:pPr marL="285750" indent="-285750">
-              <a:buFont typeface="Arial" panose="020B0604020202020204" pitchFamily="34" charset="0"/>
-              <a:buChar char="•"/>
-            </a:pPr>
-            <a:r>
-              <a:rPr lang="en-GB" dirty="0"/>
-              <a:t>Relative proportion of INDELs and SNPs after filtering but before cline analysis</a:t>
-            </a:r>
-          </a:p>
-        </p:txBody>
-      </p:sp>
-      <p:sp>
-        <p:nvSpPr>
-          <p:cNvPr id="8" name="Rectangle 7">
-            <a:extLst>
-              <a:ext uri="{FF2B5EF4-FFF2-40B4-BE49-F238E27FC236}">
-                <a16:creationId xmlns:a16="http://schemas.microsoft.com/office/drawing/2014/main" id="{D5BBA663-3347-E442-9873-012E62E37C07}"/>
-              </a:ext>
-            </a:extLst>
-          </p:cNvPr>
-          <p:cNvSpPr/>
-          <p:nvPr/>
-        </p:nvSpPr>
-        <p:spPr>
-          <a:xfrm>
-            <a:off x="397486" y="409596"/>
-            <a:ext cx="4415696" cy="369332"/>
-          </a:xfrm>
-          <a:prstGeom prst="rect">
-            <a:avLst/>
-          </a:prstGeom>
-        </p:spPr>
-        <p:txBody>
-          <a:bodyPr wrap="none">
-            <a:spAutoFit/>
-          </a:bodyPr>
-          <a:lstStyle/>
-          <a:p>
-            <a:pPr marL="342900" indent="-342900">
-              <a:buFont typeface="+mj-lt"/>
-              <a:buAutoNum type="arabicPeriod" startAt="2"/>
-            </a:pPr>
-            <a:r>
-              <a:rPr lang="en-GB" b="1" dirty="0"/>
-              <a:t>Unfolded allele frequency spectra (</a:t>
-            </a:r>
-            <a:r>
-              <a:rPr lang="en-GB" b="1" dirty="0" err="1"/>
-              <a:t>uAFS</a:t>
-            </a:r>
-            <a:r>
-              <a:rPr lang="en-GB" b="1" dirty="0"/>
-              <a:t>)</a:t>
-            </a:r>
-          </a:p>
-        </p:txBody>
-      </p:sp>
-      <p:sp>
-        <p:nvSpPr>
-          <p:cNvPr id="9" name="TextBox 8">
-            <a:extLst>
-              <a:ext uri="{FF2B5EF4-FFF2-40B4-BE49-F238E27FC236}">
-                <a16:creationId xmlns:a16="http://schemas.microsoft.com/office/drawing/2014/main" id="{5FBC7557-72FC-A44A-909B-8CF5D04F3729}"/>
-              </a:ext>
-            </a:extLst>
-          </p:cNvPr>
-          <p:cNvSpPr txBox="1"/>
-          <p:nvPr/>
-        </p:nvSpPr>
-        <p:spPr>
-          <a:xfrm>
-            <a:off x="462801" y="2188649"/>
-            <a:ext cx="4043885" cy="369332"/>
-          </a:xfrm>
-          <a:prstGeom prst="rect">
-            <a:avLst/>
-          </a:prstGeom>
-          <a:noFill/>
-        </p:spPr>
-        <p:txBody>
-          <a:bodyPr wrap="square" rtlCol="0">
-            <a:spAutoFit/>
-          </a:bodyPr>
-          <a:lstStyle/>
-          <a:p>
-            <a:pPr marL="285750" indent="-285750">
-              <a:buFont typeface="Arial" panose="020B0604020202020204" pitchFamily="34" charset="0"/>
-              <a:buChar char="•"/>
-            </a:pPr>
-            <a:r>
-              <a:rPr lang="en-GB" dirty="0"/>
-              <a:t>Kept only variants outside inversions</a:t>
-            </a:r>
-          </a:p>
-        </p:txBody>
-      </p:sp>
-      <p:pic>
-        <p:nvPicPr>
-          <p:cNvPr id="3" name="Picture 2">
-            <a:extLst>
-              <a:ext uri="{FF2B5EF4-FFF2-40B4-BE49-F238E27FC236}">
-                <a16:creationId xmlns:a16="http://schemas.microsoft.com/office/drawing/2014/main" id="{2972DBAF-E2C0-CD49-B069-67B39BB30C77}"/>
-              </a:ext>
-            </a:extLst>
-          </p:cNvPr>
-          <p:cNvPicPr>
-            <a:picLocks noChangeAspect="1"/>
-          </p:cNvPicPr>
-          <p:nvPr/>
-        </p:nvPicPr>
-        <p:blipFill>
-          <a:blip r:embed="rId2"/>
-          <a:stretch>
-            <a:fillRect/>
-          </a:stretch>
-        </p:blipFill>
-        <p:spPr>
-          <a:xfrm>
-            <a:off x="4713514" y="0"/>
-            <a:ext cx="7478486" cy="6858000"/>
-          </a:xfrm>
-          <a:prstGeom prst="rect">
-            <a:avLst/>
-          </a:prstGeom>
-        </p:spPr>
-      </p:pic>
-      <p:sp>
-        <p:nvSpPr>
-          <p:cNvPr id="7" name="TextBox 6">
-            <a:extLst>
-              <a:ext uri="{FF2B5EF4-FFF2-40B4-BE49-F238E27FC236}">
-                <a16:creationId xmlns:a16="http://schemas.microsoft.com/office/drawing/2014/main" id="{F20C078E-D3A6-6B43-99C0-8F4EE667D440}"/>
-              </a:ext>
-            </a:extLst>
-          </p:cNvPr>
-          <p:cNvSpPr txBox="1"/>
-          <p:nvPr/>
-        </p:nvSpPr>
-        <p:spPr>
-          <a:xfrm>
-            <a:off x="528114" y="3000221"/>
-            <a:ext cx="4043885" cy="2308324"/>
-          </a:xfrm>
-          <a:prstGeom prst="rect">
-            <a:avLst/>
-          </a:prstGeom>
-          <a:noFill/>
-        </p:spPr>
-        <p:txBody>
-          <a:bodyPr wrap="square" rtlCol="0">
-            <a:spAutoFit/>
-          </a:bodyPr>
-          <a:lstStyle/>
-          <a:p>
-            <a:pPr marL="285750" indent="-285750">
-              <a:buFont typeface="Arial" panose="020B0604020202020204" pitchFamily="34" charset="0"/>
-              <a:buChar char="•"/>
-            </a:pPr>
-            <a:r>
-              <a:rPr lang="en-GB" dirty="0"/>
-              <a:t>Two-sample Kolmogorov-Smirnov test</a:t>
-            </a:r>
-            <a:br>
-              <a:rPr lang="en-GB" dirty="0"/>
-            </a:br>
-            <a:r>
-              <a:rPr lang="en-GB" dirty="0"/>
-              <a:t>Null hypothesis:</a:t>
-            </a:r>
-            <a:br>
-              <a:rPr lang="en-GB" dirty="0"/>
-            </a:br>
-            <a:r>
-              <a:rPr lang="en-GB" dirty="0"/>
-              <a:t>INDELs and SNPs </a:t>
-            </a:r>
-            <a:r>
-              <a:rPr lang="en-US" dirty="0"/>
-              <a:t>are drawn from the same continuous distribution</a:t>
-            </a:r>
-            <a:endParaRPr lang="en-GB" dirty="0"/>
-          </a:p>
-          <a:p>
-            <a:pPr marL="742950" lvl="1" indent="-285750">
-              <a:buFont typeface="Arial" panose="020B0604020202020204" pitchFamily="34" charset="0"/>
-              <a:buChar char="•"/>
-            </a:pPr>
-            <a:r>
-              <a:rPr lang="en-GB" dirty="0"/>
-              <a:t>Using relative proportions, the null cannot be rejected</a:t>
-            </a:r>
-          </a:p>
-          <a:p>
-            <a:pPr marL="742950" lvl="1" indent="-285750">
-              <a:buFont typeface="Arial" panose="020B0604020202020204" pitchFamily="34" charset="0"/>
-              <a:buChar char="•"/>
-            </a:pPr>
-            <a:r>
-              <a:rPr lang="en-GB" dirty="0"/>
-              <a:t>Using square root counts, the null can be rejected</a:t>
-            </a:r>
-          </a:p>
-        </p:txBody>
-      </p:sp>
-    </p:spTree>
-    <p:extLst>
-      <p:ext uri="{BB962C8B-B14F-4D97-AF65-F5344CB8AC3E}">
-        <p14:creationId xmlns:p14="http://schemas.microsoft.com/office/powerpoint/2010/main" val="3180028549"/>
-      </p:ext>
-    </p:extLst>
-  </p:cSld>
-  <p:clrMapOvr>
-    <a:masterClrMapping/>
-  </p:clrMapOvr>
-</p:sld>
-</file>
-
-<file path=ppt/slides/slide8.xml><?xml version="1.0" encoding="utf-8"?>
-<p:sld xmlns:a="http://schemas.openxmlformats.org/drawingml/2006/main" xmlns:r="http://schemas.openxmlformats.org/officeDocument/2006/relationships" xmlns:p="http://schemas.openxmlformats.org/presentationml/2006/main">
-  <p:cSld>
-    <p:spTree>
-      <p:nvGrpSpPr>
-        <p:cNvPr id="1" name=""/>
-        <p:cNvGrpSpPr/>
-        <p:nvPr/>
-      </p:nvGrpSpPr>
-      <p:grpSpPr>
-        <a:xfrm>
-          <a:off x="0" y="0"/>
-          <a:ext cx="0" cy="0"/>
-          <a:chOff x="0" y="0"/>
-          <a:chExt cx="0" cy="0"/>
-        </a:xfrm>
-      </p:grpSpPr>
-      <p:pic>
-        <p:nvPicPr>
-          <p:cNvPr id="9" name="Picture 8">
-            <a:extLst>
-              <a:ext uri="{FF2B5EF4-FFF2-40B4-BE49-F238E27FC236}">
-                <a16:creationId xmlns:a16="http://schemas.microsoft.com/office/drawing/2014/main" id="{813F0727-7F5F-E947-AB1A-33BFBA8C725F}"/>
-              </a:ext>
-            </a:extLst>
-          </p:cNvPr>
-          <p:cNvPicPr>
-            <a:picLocks noChangeAspect="1"/>
-          </p:cNvPicPr>
-          <p:nvPr/>
-        </p:nvPicPr>
-        <p:blipFill>
-          <a:blip r:embed="rId2"/>
-          <a:stretch>
-            <a:fillRect/>
-          </a:stretch>
-        </p:blipFill>
-        <p:spPr>
-          <a:xfrm>
-            <a:off x="1130045" y="0"/>
-            <a:ext cx="9931910" cy="6858000"/>
-          </a:xfrm>
-          <a:prstGeom prst="rect">
-            <a:avLst/>
-          </a:prstGeom>
-        </p:spPr>
-      </p:pic>
-    </p:spTree>
-    <p:extLst>
-      <p:ext uri="{BB962C8B-B14F-4D97-AF65-F5344CB8AC3E}">
-        <p14:creationId xmlns:p14="http://schemas.microsoft.com/office/powerpoint/2010/main" val="3369321309"/>
       </p:ext>
     </p:extLst>
   </p:cSld>
@@ -8286,12 +8483,136 @@
           <a:chExt cx="0" cy="0"/>
         </a:xfrm>
       </p:grpSpPr>
+      <p:sp>
+        <p:nvSpPr>
+          <p:cNvPr id="5" name="TextBox 4">
+            <a:extLst>
+              <a:ext uri="{FF2B5EF4-FFF2-40B4-BE49-F238E27FC236}">
+                <a16:creationId xmlns:a16="http://schemas.microsoft.com/office/drawing/2014/main" id="{049B477E-5E39-F240-86CA-65F077DF0726}"/>
+              </a:ext>
+            </a:extLst>
+          </p:cNvPr>
+          <p:cNvSpPr txBox="1"/>
+          <p:nvPr/>
+        </p:nvSpPr>
+        <p:spPr>
+          <a:xfrm>
+            <a:off x="528115" y="1100078"/>
+            <a:ext cx="4043885" cy="923330"/>
+          </a:xfrm>
+          <a:prstGeom prst="rect">
+            <a:avLst/>
+          </a:prstGeom>
+          <a:noFill/>
+        </p:spPr>
+        <p:txBody>
+          <a:bodyPr wrap="square" rtlCol="0">
+            <a:spAutoFit/>
+          </a:bodyPr>
+          <a:lstStyle/>
+          <a:p>
+            <a:pPr marL="285750" indent="-285750">
+              <a:buFont typeface="Arial" panose="020B0604020202020204" pitchFamily="34" charset="0"/>
+              <a:buChar char="•"/>
+            </a:pPr>
+            <a:r>
+              <a:rPr lang="en-GB" dirty="0"/>
+              <a:t>Relative proportion of INDELs and SNPs after filtering but before cline analysis</a:t>
+            </a:r>
+          </a:p>
+        </p:txBody>
+      </p:sp>
+      <p:sp>
+        <p:nvSpPr>
+          <p:cNvPr id="8" name="Rectangle 7">
+            <a:extLst>
+              <a:ext uri="{FF2B5EF4-FFF2-40B4-BE49-F238E27FC236}">
+                <a16:creationId xmlns:a16="http://schemas.microsoft.com/office/drawing/2014/main" id="{D5BBA663-3347-E442-9873-012E62E37C07}"/>
+              </a:ext>
+            </a:extLst>
+          </p:cNvPr>
+          <p:cNvSpPr/>
+          <p:nvPr/>
+        </p:nvSpPr>
+        <p:spPr>
+          <a:xfrm>
+            <a:off x="397486" y="409596"/>
+            <a:ext cx="4415696" cy="369332"/>
+          </a:xfrm>
+          <a:prstGeom prst="rect">
+            <a:avLst/>
+          </a:prstGeom>
+        </p:spPr>
+        <p:txBody>
+          <a:bodyPr wrap="none">
+            <a:spAutoFit/>
+          </a:bodyPr>
+          <a:lstStyle/>
+          <a:p>
+            <a:pPr marL="342900" indent="-342900">
+              <a:buFont typeface="+mj-lt"/>
+              <a:buAutoNum type="arabicPeriod" startAt="2"/>
+            </a:pPr>
+            <a:r>
+              <a:rPr lang="en-GB" b="1" dirty="0"/>
+              <a:t>Unfolded allele frequency spectra (</a:t>
+            </a:r>
+            <a:r>
+              <a:rPr lang="en-GB" b="1" dirty="0" err="1"/>
+              <a:t>uAFS</a:t>
+            </a:r>
+            <a:r>
+              <a:rPr lang="en-GB" b="1" dirty="0"/>
+              <a:t>)</a:t>
+            </a:r>
+          </a:p>
+        </p:txBody>
+      </p:sp>
+      <p:sp>
+        <p:nvSpPr>
+          <p:cNvPr id="9" name="TextBox 8">
+            <a:extLst>
+              <a:ext uri="{FF2B5EF4-FFF2-40B4-BE49-F238E27FC236}">
+                <a16:creationId xmlns:a16="http://schemas.microsoft.com/office/drawing/2014/main" id="{5FBC7557-72FC-A44A-909B-8CF5D04F3729}"/>
+              </a:ext>
+            </a:extLst>
+          </p:cNvPr>
+          <p:cNvSpPr txBox="1"/>
+          <p:nvPr/>
+        </p:nvSpPr>
+        <p:spPr>
+          <a:xfrm>
+            <a:off x="462801" y="2188649"/>
+            <a:ext cx="4043885" cy="369332"/>
+          </a:xfrm>
+          <a:prstGeom prst="rect">
+            <a:avLst/>
+          </a:prstGeom>
+          <a:noFill/>
+        </p:spPr>
+        <p:txBody>
+          <a:bodyPr wrap="square" rtlCol="0">
+            <a:spAutoFit/>
+          </a:bodyPr>
+          <a:lstStyle/>
+          <a:p>
+            <a:pPr marL="285750" indent="-285750">
+              <a:buFont typeface="Arial" panose="020B0604020202020204" pitchFamily="34" charset="0"/>
+              <a:buChar char="•"/>
+            </a:pPr>
+            <a:r>
+              <a:rPr lang="en-GB" dirty="0"/>
+              <a:t>Kept only variants outside inversions</a:t>
+            </a:r>
+          </a:p>
+        </p:txBody>
+      </p:sp>
       <p:pic>
         <p:nvPicPr>
-          <p:cNvPr id="8" name="Picture 7">
-            <a:extLst>
-              <a:ext uri="{FF2B5EF4-FFF2-40B4-BE49-F238E27FC236}">
-                <a16:creationId xmlns:a16="http://schemas.microsoft.com/office/drawing/2014/main" id="{42B4020A-CDB6-5243-ACC8-3BBF9A1D305B}"/>
+          <p:cNvPr id="3" name="Picture 2">
+            <a:extLst>
+              <a:ext uri="{FF2B5EF4-FFF2-40B4-BE49-F238E27FC236}">
+                <a16:creationId xmlns:a16="http://schemas.microsoft.com/office/drawing/2014/main" id="{2972DBAF-E2C0-CD49-B069-67B39BB30C77}"/>
               </a:ext>
             </a:extLst>
           </p:cNvPr>
@@ -8308,18 +8629,96 @@
         </p:blipFill>
         <p:spPr>
           <a:xfrm>
-            <a:off x="1130045" y="0"/>
-            <a:ext cx="9931910" cy="6858000"/>
+            <a:off x="4713514" y="0"/>
+            <a:ext cx="7478486" cy="6858000"/>
           </a:xfrm>
           <a:prstGeom prst="rect">
             <a:avLst/>
           </a:prstGeom>
         </p:spPr>
       </p:pic>
+      <p:sp>
+        <p:nvSpPr>
+          <p:cNvPr id="7" name="TextBox 6">
+            <a:extLst>
+              <a:ext uri="{FF2B5EF4-FFF2-40B4-BE49-F238E27FC236}">
+                <a16:creationId xmlns:a16="http://schemas.microsoft.com/office/drawing/2014/main" id="{F20C078E-D3A6-6B43-99C0-8F4EE667D440}"/>
+              </a:ext>
+            </a:extLst>
+          </p:cNvPr>
+          <p:cNvSpPr txBox="1"/>
+          <p:nvPr/>
+        </p:nvSpPr>
+        <p:spPr>
+          <a:xfrm>
+            <a:off x="528114" y="3000221"/>
+            <a:ext cx="4043885" cy="2308324"/>
+          </a:xfrm>
+          <a:prstGeom prst="rect">
+            <a:avLst/>
+          </a:prstGeom>
+          <a:noFill/>
+        </p:spPr>
+        <p:txBody>
+          <a:bodyPr wrap="square" rtlCol="0">
+            <a:spAutoFit/>
+          </a:bodyPr>
+          <a:lstStyle/>
+          <a:p>
+            <a:pPr marL="285750" indent="-285750">
+              <a:buFont typeface="Arial" panose="020B0604020202020204" pitchFamily="34" charset="0"/>
+              <a:buChar char="•"/>
+            </a:pPr>
+            <a:r>
+              <a:rPr lang="en-GB" dirty="0"/>
+              <a:t>Two-sample Kolmogorov-Smirnov test</a:t>
+            </a:r>
+            <a:br>
+              <a:rPr lang="en-GB" dirty="0"/>
+            </a:br>
+            <a:r>
+              <a:rPr lang="en-GB" dirty="0"/>
+              <a:t>Null hypothesis:</a:t>
+            </a:r>
+            <a:br>
+              <a:rPr lang="en-GB" dirty="0"/>
+            </a:br>
+            <a:r>
+              <a:rPr lang="en-GB" dirty="0"/>
+              <a:t>INDELs and SNPs </a:t>
+            </a:r>
+            <a:r>
+              <a:rPr lang="en-US" dirty="0"/>
+              <a:t>are drawn from the same continuous distribution</a:t>
+            </a:r>
+            <a:endParaRPr lang="en-GB" dirty="0"/>
+          </a:p>
+          <a:p>
+            <a:pPr marL="742950" lvl="1" indent="-285750">
+              <a:buFont typeface="Arial" panose="020B0604020202020204" pitchFamily="34" charset="0"/>
+              <a:buChar char="•"/>
+            </a:pPr>
+            <a:r>
+              <a:rPr lang="en-GB" dirty="0"/>
+              <a:t>Using relative proportions, the null cannot be rejected</a:t>
+            </a:r>
+          </a:p>
+          <a:p>
+            <a:pPr marL="742950" lvl="1" indent="-285750">
+              <a:buFont typeface="Arial" panose="020B0604020202020204" pitchFamily="34" charset="0"/>
+              <a:buChar char="•"/>
+            </a:pPr>
+            <a:r>
+              <a:rPr lang="en-GB" dirty="0"/>
+              <a:t>Using square root counts, the null can be rejected</a:t>
+            </a:r>
+          </a:p>
+        </p:txBody>
+      </p:sp>
     </p:spTree>
     <p:extLst>
       <p:ext uri="{BB962C8B-B14F-4D97-AF65-F5344CB8AC3E}">
-        <p14:creationId xmlns:p14="http://schemas.microsoft.com/office/powerpoint/2010/main" val="2205415152"/>
+        <p14:creationId xmlns:p14="http://schemas.microsoft.com/office/powerpoint/2010/main" val="3180028549"/>
       </p:ext>
     </p:extLst>
   </p:cSld>

</xml_diff>

<commit_message>
csv with both fixed and poly
</commit_message>
<xml_diff>
--- a/short_genetic_variants/docs/short_indels_v02.pptx
+++ b/short_genetic_variants/docs/short_indels_v02.pptx
@@ -4990,21 +4990,51 @@
               <a:buChar char="•"/>
             </a:pPr>
             <a:r>
-              <a:rPr lang="en-GB" dirty="0"/>
+              <a:rPr lang="en-GB" dirty="0">
+                <a:solidFill>
+                  <a:schemeClr val="bg2">
+                    <a:lumMod val="90000"/>
+                  </a:schemeClr>
+                </a:solidFill>
+              </a:rPr>
               <a:t>Kept variants inside and outside inversions</a:t>
             </a:r>
             <a:br>
-              <a:rPr lang="en-GB" dirty="0"/>
+              <a:rPr lang="en-GB" dirty="0">
+                <a:solidFill>
+                  <a:schemeClr val="bg2">
+                    <a:lumMod val="90000"/>
+                  </a:schemeClr>
+                </a:solidFill>
+              </a:rPr>
             </a:br>
             <a:r>
-              <a:rPr lang="en-GB" dirty="0"/>
+              <a:rPr lang="en-GB" dirty="0">
+                <a:solidFill>
+                  <a:schemeClr val="bg2">
+                    <a:lumMod val="90000"/>
+                  </a:schemeClr>
+                </a:solidFill>
+              </a:rPr>
               <a:t>Unique INDELs = 20005</a:t>
             </a:r>
             <a:br>
-              <a:rPr lang="en-GB" dirty="0"/>
+              <a:rPr lang="en-GB" dirty="0">
+                <a:solidFill>
+                  <a:schemeClr val="bg2">
+                    <a:lumMod val="90000"/>
+                  </a:schemeClr>
+                </a:solidFill>
+              </a:rPr>
             </a:br>
             <a:r>
-              <a:rPr lang="en-GB" dirty="0"/>
+              <a:rPr lang="en-GB" dirty="0">
+                <a:solidFill>
+                  <a:schemeClr val="bg2">
+                    <a:lumMod val="90000"/>
+                  </a:schemeClr>
+                </a:solidFill>
+              </a:rPr>
               <a:t>Unique SNPs = 89770</a:t>
             </a:r>
           </a:p>
@@ -5022,21 +5052,25 @@
             </a:pPr>
             <a:r>
               <a:rPr lang="en-GB" dirty="0"/>
-              <a:t>With map position</a:t>
+              <a:t>With map position and </a:t>
+            </a:r>
+            <a:r>
+              <a:rPr lang="en-GB" u="sng" dirty="0"/>
+              <a:t>inversions</a:t>
             </a:r>
             <a:br>
               <a:rPr lang="en-GB" dirty="0"/>
             </a:br>
             <a:r>
               <a:rPr lang="en-GB" dirty="0"/>
-              <a:t>Unique INDELs = 7209</a:t>
+              <a:t>Unique INDELs = 7206</a:t>
             </a:r>
             <a:br>
               <a:rPr lang="en-GB" dirty="0"/>
             </a:br>
             <a:r>
               <a:rPr lang="en-GB" dirty="0"/>
-              <a:t>Unique SNPs = 34290</a:t>
+              <a:t>Unique SNPs = 34287</a:t>
             </a:r>
           </a:p>
           <a:p>
@@ -5052,21 +5086,51 @@
               <a:buChar char="•"/>
             </a:pPr>
             <a:r>
-              <a:rPr lang="en-GB" dirty="0"/>
+              <a:rPr lang="en-GB" dirty="0">
+                <a:solidFill>
+                  <a:schemeClr val="bg2">
+                    <a:lumMod val="90000"/>
+                  </a:schemeClr>
+                </a:solidFill>
+              </a:rPr>
               <a:t>Without map position</a:t>
             </a:r>
             <a:br>
-              <a:rPr lang="en-GB" dirty="0"/>
+              <a:rPr lang="en-GB" dirty="0">
+                <a:solidFill>
+                  <a:schemeClr val="bg2">
+                    <a:lumMod val="90000"/>
+                  </a:schemeClr>
+                </a:solidFill>
+              </a:rPr>
             </a:br>
             <a:r>
-              <a:rPr lang="en-GB" dirty="0"/>
+              <a:rPr lang="en-GB" dirty="0">
+                <a:solidFill>
+                  <a:schemeClr val="bg2">
+                    <a:lumMod val="90000"/>
+                  </a:schemeClr>
+                </a:solidFill>
+              </a:rPr>
               <a:t>Unique INDELs = 12796</a:t>
             </a:r>
             <a:br>
-              <a:rPr lang="en-GB" dirty="0"/>
+              <a:rPr lang="en-GB" dirty="0">
+                <a:solidFill>
+                  <a:schemeClr val="bg2">
+                    <a:lumMod val="90000"/>
+                  </a:schemeClr>
+                </a:solidFill>
+              </a:rPr>
             </a:br>
             <a:r>
-              <a:rPr lang="en-GB" dirty="0"/>
+              <a:rPr lang="en-GB" dirty="0">
+                <a:solidFill>
+                  <a:schemeClr val="bg2">
+                    <a:lumMod val="90000"/>
+                  </a:schemeClr>
+                </a:solidFill>
+              </a:rPr>
               <a:t>Unique SNPs = 55480</a:t>
             </a:r>
           </a:p>
@@ -5117,36 +5181,6 @@
           </a:p>
         </p:txBody>
       </p:sp>
-      <p:pic>
-        <p:nvPicPr>
-          <p:cNvPr id="3" name="Picture 2">
-            <a:extLst>
-              <a:ext uri="{FF2B5EF4-FFF2-40B4-BE49-F238E27FC236}">
-                <a16:creationId xmlns:a16="http://schemas.microsoft.com/office/drawing/2014/main" id="{3E6479BB-6EE6-6F40-B817-A34BC57B5652}"/>
-              </a:ext>
-            </a:extLst>
-          </p:cNvPr>
-          <p:cNvPicPr>
-            <a:picLocks noChangeAspect="1"/>
-          </p:cNvPicPr>
-          <p:nvPr/>
-        </p:nvPicPr>
-        <p:blipFill>
-          <a:blip r:embed="rId2"/>
-          <a:stretch>
-            <a:fillRect/>
-          </a:stretch>
-        </p:blipFill>
-        <p:spPr>
-          <a:xfrm>
-            <a:off x="115615" y="778929"/>
-            <a:ext cx="6079072" cy="6079072"/>
-          </a:xfrm>
-          <a:prstGeom prst="rect">
-            <a:avLst/>
-          </a:prstGeom>
-        </p:spPr>
-      </p:pic>
       <p:graphicFrame>
         <p:nvGraphicFramePr>
           <p:cNvPr id="8" name="Table 13">
@@ -5162,7 +5196,7 @@
           <p:nvPr>
             <p:extLst>
               <p:ext uri="{D42A27DB-BD31-4B8C-83A1-F6EECF244321}">
-                <p14:modId xmlns:p14="http://schemas.microsoft.com/office/powerpoint/2010/main" val="4061610662"/>
+                <p14:modId xmlns:p14="http://schemas.microsoft.com/office/powerpoint/2010/main" val="2724688889"/>
               </p:ext>
             </p:extLst>
           </p:nvPr>
@@ -5344,7 +5378,7 @@
                             <a:schemeClr val="tx1"/>
                           </a:solidFill>
                         </a:rPr>
-                        <a:t>0.77</a:t>
+                        <a:t>0.56</a:t>
                       </a:r>
                     </a:p>
                   </a:txBody>
@@ -5361,7 +5395,7 @@
                             <a:schemeClr val="tx1"/>
                           </a:solidFill>
                         </a:rPr>
-                        <a:t>0.77</a:t>
+                        <a:t>0.53</a:t>
                       </a:r>
                     </a:p>
                   </a:txBody>
@@ -5378,7 +5412,7 @@
                             <a:schemeClr val="tx1"/>
                           </a:solidFill>
                         </a:rPr>
-                        <a:t>0.77</a:t>
+                        <a:t>0.55</a:t>
                       </a:r>
                     </a:p>
                   </a:txBody>
@@ -5429,7 +5463,7 @@
                             <a:schemeClr val="tx1"/>
                           </a:solidFill>
                         </a:rPr>
-                        <a:t>0.79</a:t>
+                        <a:t>0.59</a:t>
                       </a:r>
                     </a:p>
                   </a:txBody>
@@ -5446,7 +5480,7 @@
                             <a:schemeClr val="tx1"/>
                           </a:solidFill>
                         </a:rPr>
-                        <a:t>0.79</a:t>
+                        <a:t>0.59</a:t>
                       </a:r>
                     </a:p>
                   </a:txBody>
@@ -5463,7 +5497,7 @@
                             <a:schemeClr val="tx1"/>
                           </a:solidFill>
                         </a:rPr>
-                        <a:t>0.79</a:t>
+                        <a:t>0.59</a:t>
                       </a:r>
                     </a:p>
                   </a:txBody>
@@ -5514,7 +5548,7 @@
                             <a:schemeClr val="tx1"/>
                           </a:solidFill>
                         </a:rPr>
-                        <a:t>0.79</a:t>
+                        <a:t>0.57</a:t>
                       </a:r>
                     </a:p>
                   </a:txBody>
@@ -5541,7 +5575,7 @@
                             <a:schemeClr val="tx1"/>
                           </a:solidFill>
                         </a:rPr>
-                        <a:t>0.79</a:t>
+                        <a:t>0.57</a:t>
                       </a:r>
                     </a:p>
                   </a:txBody>
@@ -5568,7 +5602,7 @@
                             <a:schemeClr val="tx1"/>
                           </a:solidFill>
                         </a:rPr>
-                        <a:t>0.79</a:t>
+                        <a:t>0.58</a:t>
                       </a:r>
                     </a:p>
                   </a:txBody>
@@ -5630,6 +5664,36 @@
           </a:graphicData>
         </a:graphic>
       </p:graphicFrame>
+      <p:pic>
+        <p:nvPicPr>
+          <p:cNvPr id="7" name="Picture 6">
+            <a:extLst>
+              <a:ext uri="{FF2B5EF4-FFF2-40B4-BE49-F238E27FC236}">
+                <a16:creationId xmlns:a16="http://schemas.microsoft.com/office/drawing/2014/main" id="{12AEE58D-CB15-6B43-9852-2176587C7C6F}"/>
+              </a:ext>
+            </a:extLst>
+          </p:cNvPr>
+          <p:cNvPicPr>
+            <a:picLocks noChangeAspect="1"/>
+          </p:cNvPicPr>
+          <p:nvPr/>
+        </p:nvPicPr>
+        <p:blipFill>
+          <a:blip r:embed="rId2"/>
+          <a:stretch>
+            <a:fillRect/>
+          </a:stretch>
+        </p:blipFill>
+        <p:spPr>
+          <a:xfrm>
+            <a:off x="0" y="778928"/>
+            <a:ext cx="6079072" cy="6079072"/>
+          </a:xfrm>
+          <a:prstGeom prst="rect">
+            <a:avLst/>
+          </a:prstGeom>
+        </p:spPr>
+      </p:pic>
     </p:spTree>
     <p:extLst>
       <p:ext uri="{BB962C8B-B14F-4D97-AF65-F5344CB8AC3E}">
@@ -5707,21 +5771,51 @@
               <a:buChar char="•"/>
             </a:pPr>
             <a:r>
-              <a:rPr lang="en-GB" dirty="0"/>
+              <a:rPr lang="en-GB" dirty="0">
+                <a:solidFill>
+                  <a:schemeClr val="bg2">
+                    <a:lumMod val="90000"/>
+                  </a:schemeClr>
+                </a:solidFill>
+              </a:rPr>
               <a:t>Kept only variants outside inversions</a:t>
             </a:r>
             <a:br>
-              <a:rPr lang="en-GB" dirty="0"/>
+              <a:rPr lang="en-GB" dirty="0">
+                <a:solidFill>
+                  <a:schemeClr val="bg2">
+                    <a:lumMod val="90000"/>
+                  </a:schemeClr>
+                </a:solidFill>
+              </a:rPr>
             </a:br>
             <a:r>
-              <a:rPr lang="en-GB" dirty="0"/>
+              <a:rPr lang="en-GB" dirty="0">
+                <a:solidFill>
+                  <a:schemeClr val="bg2">
+                    <a:lumMod val="90000"/>
+                  </a:schemeClr>
+                </a:solidFill>
+              </a:rPr>
               <a:t>Unique INDELs = 18373</a:t>
             </a:r>
             <a:br>
-              <a:rPr lang="en-GB" dirty="0"/>
+              <a:rPr lang="en-GB" dirty="0">
+                <a:solidFill>
+                  <a:schemeClr val="bg2">
+                    <a:lumMod val="90000"/>
+                  </a:schemeClr>
+                </a:solidFill>
+              </a:rPr>
             </a:br>
             <a:r>
-              <a:rPr lang="en-GB" dirty="0"/>
+              <a:rPr lang="en-GB" dirty="0">
+                <a:solidFill>
+                  <a:schemeClr val="bg2">
+                    <a:lumMod val="90000"/>
+                  </a:schemeClr>
+                </a:solidFill>
+              </a:rPr>
               <a:t>Unique SNPs = 82087</a:t>
             </a:r>
           </a:p>
@@ -5739,21 +5833,25 @@
             </a:pPr>
             <a:r>
               <a:rPr lang="en-GB" dirty="0"/>
-              <a:t>With map position</a:t>
+              <a:t>With map position and </a:t>
+            </a:r>
+            <a:r>
+              <a:rPr lang="en-GB" u="sng" dirty="0"/>
+              <a:t>no inversions</a:t>
             </a:r>
             <a:br>
               <a:rPr lang="en-GB" dirty="0"/>
             </a:br>
             <a:r>
               <a:rPr lang="en-GB" dirty="0"/>
-              <a:t>Unique INDELs = 5577</a:t>
+              <a:t>Unique INDELs = 5576</a:t>
             </a:r>
             <a:br>
               <a:rPr lang="en-GB" dirty="0"/>
             </a:br>
             <a:r>
               <a:rPr lang="en-GB" dirty="0"/>
-              <a:t>Unique SNPs = 26607</a:t>
+              <a:t>Unique SNPs = 26604</a:t>
             </a:r>
           </a:p>
           <a:p>
@@ -5769,21 +5867,51 @@
               <a:buChar char="•"/>
             </a:pPr>
             <a:r>
-              <a:rPr lang="en-GB" dirty="0"/>
+              <a:rPr lang="en-GB" dirty="0">
+                <a:solidFill>
+                  <a:schemeClr val="bg2">
+                    <a:lumMod val="90000"/>
+                  </a:schemeClr>
+                </a:solidFill>
+              </a:rPr>
               <a:t>Without map position</a:t>
             </a:r>
             <a:br>
-              <a:rPr lang="en-GB" dirty="0"/>
+              <a:rPr lang="en-GB" dirty="0">
+                <a:solidFill>
+                  <a:schemeClr val="bg2">
+                    <a:lumMod val="90000"/>
+                  </a:schemeClr>
+                </a:solidFill>
+              </a:rPr>
             </a:br>
             <a:r>
-              <a:rPr lang="en-GB" dirty="0"/>
+              <a:rPr lang="en-GB" dirty="0">
+                <a:solidFill>
+                  <a:schemeClr val="bg2">
+                    <a:lumMod val="90000"/>
+                  </a:schemeClr>
+                </a:solidFill>
+              </a:rPr>
               <a:t>Unique INDELs = 12796</a:t>
             </a:r>
             <a:br>
-              <a:rPr lang="en-GB" dirty="0"/>
+              <a:rPr lang="en-GB" dirty="0">
+                <a:solidFill>
+                  <a:schemeClr val="bg2">
+                    <a:lumMod val="90000"/>
+                  </a:schemeClr>
+                </a:solidFill>
+              </a:rPr>
             </a:br>
             <a:r>
-              <a:rPr lang="en-GB" dirty="0"/>
+              <a:rPr lang="en-GB" dirty="0">
+                <a:solidFill>
+                  <a:schemeClr val="bg2">
+                    <a:lumMod val="90000"/>
+                  </a:schemeClr>
+                </a:solidFill>
+              </a:rPr>
               <a:t>Unique SNPs = 55480</a:t>
             </a:r>
           </a:p>
@@ -5842,7 +5970,7 @@
           <p:nvPr>
             <p:extLst>
               <p:ext uri="{D42A27DB-BD31-4B8C-83A1-F6EECF244321}">
-                <p14:modId xmlns:p14="http://schemas.microsoft.com/office/powerpoint/2010/main" val="3756705546"/>
+                <p14:modId xmlns:p14="http://schemas.microsoft.com/office/powerpoint/2010/main" val="4195240577"/>
               </p:ext>
             </p:extLst>
           </p:nvPr>
@@ -6024,7 +6152,7 @@
                             <a:schemeClr val="tx1"/>
                           </a:solidFill>
                         </a:rPr>
-                        <a:t>0.78</a:t>
+                        <a:t>0.55</a:t>
                       </a:r>
                     </a:p>
                   </a:txBody>
@@ -6041,7 +6169,7 @@
                             <a:schemeClr val="tx1"/>
                           </a:solidFill>
                         </a:rPr>
-                        <a:t>0.78</a:t>
+                        <a:t>0.53</a:t>
                       </a:r>
                     </a:p>
                   </a:txBody>
@@ -6058,7 +6186,7 @@
                             <a:schemeClr val="tx1"/>
                           </a:solidFill>
                         </a:rPr>
-                        <a:t>0.78</a:t>
+                        <a:t>0.54</a:t>
                       </a:r>
                     </a:p>
                   </a:txBody>
@@ -6109,7 +6237,7 @@
                             <a:schemeClr val="tx1"/>
                           </a:solidFill>
                         </a:rPr>
-                        <a:t>0.79</a:t>
+                        <a:t>0.59</a:t>
                       </a:r>
                     </a:p>
                   </a:txBody>
@@ -6126,7 +6254,7 @@
                             <a:schemeClr val="tx1"/>
                           </a:solidFill>
                         </a:rPr>
-                        <a:t>0.79</a:t>
+                        <a:t>0.59</a:t>
                       </a:r>
                     </a:p>
                   </a:txBody>
@@ -6143,7 +6271,7 @@
                             <a:schemeClr val="tx1"/>
                           </a:solidFill>
                         </a:rPr>
-                        <a:t>0.79</a:t>
+                        <a:t>0.59</a:t>
                       </a:r>
                     </a:p>
                   </a:txBody>
@@ -6194,7 +6322,7 @@
                             <a:schemeClr val="tx1"/>
                           </a:solidFill>
                         </a:rPr>
-                        <a:t>0.79</a:t>
+                        <a:t>0.57</a:t>
                       </a:r>
                     </a:p>
                   </a:txBody>
@@ -6221,7 +6349,7 @@
                             <a:schemeClr val="tx1"/>
                           </a:solidFill>
                         </a:rPr>
-                        <a:t>0.79</a:t>
+                        <a:t>0.58</a:t>
                       </a:r>
                     </a:p>
                   </a:txBody>
@@ -6248,7 +6376,7 @@
                             <a:schemeClr val="tx1"/>
                           </a:solidFill>
                         </a:rPr>
-                        <a:t>0.79</a:t>
+                        <a:t>0.58</a:t>
                       </a:r>
                     </a:p>
                   </a:txBody>
@@ -6312,10 +6440,10 @@
       </p:graphicFrame>
       <p:pic>
         <p:nvPicPr>
-          <p:cNvPr id="4" name="Picture 3">
-            <a:extLst>
-              <a:ext uri="{FF2B5EF4-FFF2-40B4-BE49-F238E27FC236}">
-                <a16:creationId xmlns:a16="http://schemas.microsoft.com/office/drawing/2014/main" id="{AA34348C-9B8E-E244-ABC0-E5850888A62A}"/>
+          <p:cNvPr id="3" name="Picture 2">
+            <a:extLst>
+              <a:ext uri="{FF2B5EF4-FFF2-40B4-BE49-F238E27FC236}">
+                <a16:creationId xmlns:a16="http://schemas.microsoft.com/office/drawing/2014/main" id="{4EFDAD11-8B08-F543-BD34-E305D9DC2C99}"/>
               </a:ext>
             </a:extLst>
           </p:cNvPr>
@@ -6332,7 +6460,7 @@
         </p:blipFill>
         <p:spPr>
           <a:xfrm>
-            <a:off x="68444" y="778928"/>
+            <a:off x="0" y="778928"/>
             <a:ext cx="6079072" cy="6079072"/>
           </a:xfrm>
           <a:prstGeom prst="rect">
@@ -8058,139 +8186,282 @@
           </a:graphicData>
         </a:graphic>
       </p:graphicFrame>
-      <p:sp>
-        <p:nvSpPr>
-          <p:cNvPr id="3" name="TextBox 2">
-            <a:extLst>
-              <a:ext uri="{FF2B5EF4-FFF2-40B4-BE49-F238E27FC236}">
-                <a16:creationId xmlns:a16="http://schemas.microsoft.com/office/drawing/2014/main" id="{DDFA6007-978B-FA4E-B629-4D17DEE1E1AB}"/>
-              </a:ext>
-            </a:extLst>
-          </p:cNvPr>
-          <p:cNvSpPr txBox="1"/>
-          <p:nvPr/>
-        </p:nvSpPr>
-        <p:spPr>
-          <a:xfrm>
-            <a:off x="528115" y="5475514"/>
-            <a:ext cx="3762965" cy="1015663"/>
-          </a:xfrm>
-          <a:prstGeom prst="rect">
-            <a:avLst/>
-          </a:prstGeom>
-          <a:noFill/>
-        </p:spPr>
-        <p:txBody>
-          <a:bodyPr wrap="square" rtlCol="0">
-            <a:spAutoFit/>
-          </a:bodyPr>
-          <a:lstStyle/>
-          <a:p>
-            <a:r>
-              <a:rPr lang="en-GB" sz="2000" b="1"/>
-              <a:t>For the rest of the results, kept only variants highlighted in green that were polymorphic.</a:t>
-            </a:r>
-          </a:p>
-        </p:txBody>
-      </p:sp>
-      <p:sp>
-        <p:nvSpPr>
-          <p:cNvPr id="7" name="TextBox 6">
-            <a:extLst>
-              <a:ext uri="{FF2B5EF4-FFF2-40B4-BE49-F238E27FC236}">
-                <a16:creationId xmlns:a16="http://schemas.microsoft.com/office/drawing/2014/main" id="{86951483-1209-4D4F-A115-5A943914344F}"/>
-              </a:ext>
-            </a:extLst>
-          </p:cNvPr>
-          <p:cNvSpPr txBox="1"/>
-          <p:nvPr/>
-        </p:nvSpPr>
-        <p:spPr>
-          <a:xfrm>
-            <a:off x="528115" y="3018046"/>
-            <a:ext cx="3976152" cy="830997"/>
-          </a:xfrm>
-          <a:prstGeom prst="rect">
-            <a:avLst/>
-          </a:prstGeom>
-          <a:noFill/>
-        </p:spPr>
-        <p:txBody>
-          <a:bodyPr wrap="square" rtlCol="0">
-            <a:spAutoFit/>
-          </a:bodyPr>
-          <a:lstStyle/>
-          <a:p>
-            <a:pPr marL="285750" indent="-285750">
-              <a:buFont typeface="Arial" panose="020B0604020202020204" pitchFamily="34" charset="0"/>
-              <a:buChar char="•"/>
-            </a:pPr>
-            <a:r>
-              <a:rPr lang="en-GB" sz="1600" dirty="0"/>
-              <a:t>Fixed differences removed:</a:t>
-            </a:r>
-            <a:br>
-              <a:rPr lang="en-GB" sz="1600" dirty="0"/>
-            </a:br>
-            <a:br>
-              <a:rPr lang="en-GB" sz="1600" dirty="0"/>
-            </a:br>
-            <a:r>
-              <a:rPr lang="en-GB" sz="1600" dirty="0"/>
-              <a:t>SNPs = 148; INDELs = 42; ratio = 3.5</a:t>
-            </a:r>
-          </a:p>
-        </p:txBody>
-      </p:sp>
-      <p:sp>
-        <p:nvSpPr>
-          <p:cNvPr id="8" name="TextBox 7">
-            <a:extLst>
-              <a:ext uri="{FF2B5EF4-FFF2-40B4-BE49-F238E27FC236}">
-                <a16:creationId xmlns:a16="http://schemas.microsoft.com/office/drawing/2014/main" id="{5E15A81C-47F8-304C-A119-419BB111BD10}"/>
-              </a:ext>
-            </a:extLst>
-          </p:cNvPr>
-          <p:cNvSpPr txBox="1"/>
-          <p:nvPr/>
-        </p:nvSpPr>
-        <p:spPr>
-          <a:xfrm>
-            <a:off x="528115" y="4146898"/>
-            <a:ext cx="3976152" cy="1077218"/>
-          </a:xfrm>
-          <a:prstGeom prst="rect">
-            <a:avLst/>
-          </a:prstGeom>
-          <a:noFill/>
-        </p:spPr>
-        <p:txBody>
-          <a:bodyPr wrap="square" rtlCol="0">
-            <a:spAutoFit/>
-          </a:bodyPr>
-          <a:lstStyle/>
-          <a:p>
-            <a:pPr marL="285750" indent="-285750">
-              <a:buFont typeface="Arial" panose="020B0604020202020204" pitchFamily="34" charset="0"/>
-              <a:buChar char="•"/>
-            </a:pPr>
-            <a:r>
-              <a:rPr lang="en-GB" sz="1600" dirty="0"/>
-              <a:t>Total number of polymorphic unique variants before cline analysis:</a:t>
-            </a:r>
-            <a:br>
-              <a:rPr lang="en-GB" sz="1600" dirty="0"/>
-            </a:br>
-            <a:br>
-              <a:rPr lang="en-GB" sz="1600" dirty="0"/>
-            </a:br>
-            <a:r>
-              <a:rPr lang="en-GB" sz="1600" dirty="0"/>
-              <a:t>SNPs = 89770; INDELs = 20005; ratio = 4.5</a:t>
-            </a:r>
-          </a:p>
-        </p:txBody>
-      </p:sp>
+      <p:graphicFrame>
+        <p:nvGraphicFramePr>
+          <p:cNvPr id="5" name="Table 5">
+            <a:extLst>
+              <a:ext uri="{FF2B5EF4-FFF2-40B4-BE49-F238E27FC236}">
+                <a16:creationId xmlns:a16="http://schemas.microsoft.com/office/drawing/2014/main" id="{2F45DF47-5452-2B49-B3D9-35915068DF35}"/>
+              </a:ext>
+            </a:extLst>
+          </p:cNvPr>
+          <p:cNvGraphicFramePr>
+            <a:graphicFrameLocks noGrp="1"/>
+          </p:cNvGraphicFramePr>
+          <p:nvPr>
+            <p:extLst>
+              <p:ext uri="{D42A27DB-BD31-4B8C-83A1-F6EECF244321}">
+                <p14:modId xmlns:p14="http://schemas.microsoft.com/office/powerpoint/2010/main" val="1146172740"/>
+              </p:ext>
+            </p:extLst>
+          </p:nvPr>
+        </p:nvGraphicFramePr>
+        <p:xfrm>
+          <a:off x="528116" y="3429000"/>
+          <a:ext cx="3390741" cy="1545771"/>
+        </p:xfrm>
+        <a:graphic>
+          <a:graphicData uri="http://schemas.openxmlformats.org/drawingml/2006/table">
+            <a:tbl>
+              <a:tblPr>
+                <a:tableStyleId>{5940675A-B579-460E-94D1-54222C63F5DA}</a:tableStyleId>
+              </a:tblPr>
+              <a:tblGrid>
+                <a:gridCol w="767284">
+                  <a:extLst>
+                    <a:ext uri="{9D8B030D-6E8A-4147-A177-3AD203B41FA5}">
+                      <a16:colId xmlns:a16="http://schemas.microsoft.com/office/drawing/2014/main" val="298993595"/>
+                    </a:ext>
+                  </a:extLst>
+                </a:gridCol>
+                <a:gridCol w="740229">
+                  <a:extLst>
+                    <a:ext uri="{9D8B030D-6E8A-4147-A177-3AD203B41FA5}">
+                      <a16:colId xmlns:a16="http://schemas.microsoft.com/office/drawing/2014/main" val="3856636425"/>
+                    </a:ext>
+                  </a:extLst>
+                </a:gridCol>
+                <a:gridCol w="1164771">
+                  <a:extLst>
+                    <a:ext uri="{9D8B030D-6E8A-4147-A177-3AD203B41FA5}">
+                      <a16:colId xmlns:a16="http://schemas.microsoft.com/office/drawing/2014/main" val="1194037803"/>
+                    </a:ext>
+                  </a:extLst>
+                </a:gridCol>
+                <a:gridCol w="718457">
+                  <a:extLst>
+                    <a:ext uri="{9D8B030D-6E8A-4147-A177-3AD203B41FA5}">
+                      <a16:colId xmlns:a16="http://schemas.microsoft.com/office/drawing/2014/main" val="3198074171"/>
+                    </a:ext>
+                  </a:extLst>
+                </a:gridCol>
+              </a:tblGrid>
+              <a:tr h="515257">
+                <a:tc>
+                  <a:txBody>
+                    <a:bodyPr/>
+                    <a:lstStyle/>
+                    <a:p>
+                      <a:endParaRPr lang="en-GB" sz="1400" dirty="0"/>
+                    </a:p>
+                  </a:txBody>
+                  <a:tcPr>
+                    <a:noFill/>
+                  </a:tcPr>
+                </a:tc>
+                <a:tc>
+                  <a:txBody>
+                    <a:bodyPr/>
+                    <a:lstStyle/>
+                    <a:p>
+                      <a:r>
+                        <a:rPr lang="en-GB" sz="1400" dirty="0"/>
+                        <a:t>Fixed</a:t>
+                      </a:r>
+                    </a:p>
+                  </a:txBody>
+                  <a:tcPr>
+                    <a:solidFill>
+                      <a:schemeClr val="bg1">
+                        <a:lumMod val="85000"/>
+                      </a:schemeClr>
+                    </a:solidFill>
+                  </a:tcPr>
+                </a:tc>
+                <a:tc>
+                  <a:txBody>
+                    <a:bodyPr/>
+                    <a:lstStyle/>
+                    <a:p>
+                      <a:r>
+                        <a:rPr lang="en-GB" sz="1400" dirty="0"/>
+                        <a:t>Polymorphic</a:t>
+                      </a:r>
+                    </a:p>
+                  </a:txBody>
+                  <a:tcPr>
+                    <a:solidFill>
+                      <a:srgbClr val="91CE4F"/>
+                    </a:solidFill>
+                  </a:tcPr>
+                </a:tc>
+                <a:tc>
+                  <a:txBody>
+                    <a:bodyPr/>
+                    <a:lstStyle/>
+                    <a:p>
+                      <a:r>
+                        <a:rPr lang="en-GB" sz="1400" dirty="0"/>
+                        <a:t>Ratio</a:t>
+                      </a:r>
+                    </a:p>
+                  </a:txBody>
+                  <a:tcPr>
+                    <a:solidFill>
+                      <a:schemeClr val="bg1">
+                        <a:lumMod val="85000"/>
+                      </a:schemeClr>
+                    </a:solidFill>
+                  </a:tcPr>
+                </a:tc>
+                <a:extLst>
+                  <a:ext uri="{0D108BD9-81ED-4DB2-BD59-A6C34878D82A}">
+                    <a16:rowId xmlns:a16="http://schemas.microsoft.com/office/drawing/2014/main" val="2156922573"/>
+                  </a:ext>
+                </a:extLst>
+              </a:tr>
+              <a:tr h="515257">
+                <a:tc>
+                  <a:txBody>
+                    <a:bodyPr/>
+                    <a:lstStyle/>
+                    <a:p>
+                      <a:r>
+                        <a:rPr lang="en-GB" sz="1400" dirty="0"/>
+                        <a:t>INDELs</a:t>
+                      </a:r>
+                    </a:p>
+                  </a:txBody>
+                  <a:tcPr>
+                    <a:solidFill>
+                      <a:schemeClr val="bg1">
+                        <a:lumMod val="85000"/>
+                      </a:schemeClr>
+                    </a:solidFill>
+                  </a:tcPr>
+                </a:tc>
+                <a:tc>
+                  <a:txBody>
+                    <a:bodyPr/>
+                    <a:lstStyle/>
+                    <a:p>
+                      <a:r>
+                        <a:rPr lang="en-GB" sz="1400" dirty="0"/>
+                        <a:t>10511</a:t>
+                      </a:r>
+                    </a:p>
+                  </a:txBody>
+                  <a:tcPr/>
+                </a:tc>
+                <a:tc>
+                  <a:txBody>
+                    <a:bodyPr/>
+                    <a:lstStyle/>
+                    <a:p>
+                      <a:r>
+                        <a:rPr lang="en-GB" sz="1400" dirty="0"/>
+                        <a:t>20000</a:t>
+                      </a:r>
+                    </a:p>
+                  </a:txBody>
+                  <a:tcPr>
+                    <a:solidFill>
+                      <a:srgbClr val="91CE4F"/>
+                    </a:solidFill>
+                  </a:tcPr>
+                </a:tc>
+                <a:tc>
+                  <a:txBody>
+                    <a:bodyPr/>
+                    <a:lstStyle/>
+                    <a:p>
+                      <a:r>
+                        <a:rPr lang="en-GB" sz="1400" dirty="0"/>
+                        <a:t>1.9</a:t>
+                      </a:r>
+                    </a:p>
+                  </a:txBody>
+                  <a:tcPr/>
+                </a:tc>
+                <a:extLst>
+                  <a:ext uri="{0D108BD9-81ED-4DB2-BD59-A6C34878D82A}">
+                    <a16:rowId xmlns:a16="http://schemas.microsoft.com/office/drawing/2014/main" val="2484650901"/>
+                  </a:ext>
+                </a:extLst>
+              </a:tr>
+              <a:tr h="515257">
+                <a:tc>
+                  <a:txBody>
+                    <a:bodyPr/>
+                    <a:lstStyle/>
+                    <a:p>
+                      <a:r>
+                        <a:rPr lang="en-GB" sz="1400" dirty="0"/>
+                        <a:t>SNPs</a:t>
+                      </a:r>
+                    </a:p>
+                  </a:txBody>
+                  <a:tcPr>
+                    <a:solidFill>
+                      <a:schemeClr val="bg1">
+                        <a:lumMod val="85000"/>
+                      </a:schemeClr>
+                    </a:solidFill>
+                  </a:tcPr>
+                </a:tc>
+                <a:tc>
+                  <a:txBody>
+                    <a:bodyPr/>
+                    <a:lstStyle/>
+                    <a:p>
+                      <a:r>
+                        <a:rPr lang="en-GB" sz="1400" dirty="0"/>
+                        <a:t>43355</a:t>
+                      </a:r>
+                    </a:p>
+                  </a:txBody>
+                  <a:tcPr/>
+                </a:tc>
+                <a:tc>
+                  <a:txBody>
+                    <a:bodyPr/>
+                    <a:lstStyle/>
+                    <a:p>
+                      <a:r>
+                        <a:rPr lang="en-GB" sz="1400" dirty="0"/>
+                        <a:t>89745</a:t>
+                      </a:r>
+                    </a:p>
+                  </a:txBody>
+                  <a:tcPr>
+                    <a:solidFill>
+                      <a:srgbClr val="91CE4F"/>
+                    </a:solidFill>
+                  </a:tcPr>
+                </a:tc>
+                <a:tc>
+                  <a:txBody>
+                    <a:bodyPr/>
+                    <a:lstStyle/>
+                    <a:p>
+                      <a:r>
+                        <a:rPr lang="en-GB" sz="1400" dirty="0"/>
+                        <a:t>2.1</a:t>
+                      </a:r>
+                    </a:p>
+                  </a:txBody>
+                  <a:tcPr/>
+                </a:tc>
+                <a:extLst>
+                  <a:ext uri="{0D108BD9-81ED-4DB2-BD59-A6C34878D82A}">
+                    <a16:rowId xmlns:a16="http://schemas.microsoft.com/office/drawing/2014/main" val="825248952"/>
+                  </a:ext>
+                </a:extLst>
+              </a:tr>
+            </a:tbl>
+          </a:graphicData>
+        </a:graphic>
+      </p:graphicFrame>
     </p:spTree>
     <p:extLst>
       <p:ext uri="{BB962C8B-B14F-4D97-AF65-F5344CB8AC3E}">

</xml_diff>

<commit_message>
n individuals filter cutoff
</commit_message>
<xml_diff>
--- a/short_genetic_variants/docs/short_indels_v02.pptx
+++ b/short_genetic_variants/docs/short_indels_v02.pptx
@@ -15,8 +15,8 @@
     <p:sldId id="275" r:id="rId6"/>
     <p:sldId id="299" r:id="rId7"/>
     <p:sldId id="273" r:id="rId8"/>
-    <p:sldId id="288" r:id="rId9"/>
-    <p:sldId id="298" r:id="rId10"/>
+    <p:sldId id="303" r:id="rId9"/>
+    <p:sldId id="288" r:id="rId10"/>
     <p:sldId id="289" r:id="rId11"/>
     <p:sldId id="292" r:id="rId12"/>
     <p:sldId id="293" r:id="rId13"/>
@@ -210,7 +210,7 @@
           <a:p>
             <a:fld id="{ADC703C6-BB32-1847-9BA4-6A93FF920BED}" type="datetimeFigureOut">
               <a:rPr lang="en-GB" smtClean="0"/>
-              <a:t>24/08/2020</a:t>
+              <a:t>27/08/2020</a:t>
             </a:fld>
             <a:endParaRPr lang="en-GB"/>
           </a:p>
@@ -711,7 +711,7 @@
           <a:p>
             <a:fld id="{5C316670-22DA-CE45-BF19-C0B19D676291}" type="datetimeFigureOut">
               <a:rPr lang="en-GB" smtClean="0"/>
-              <a:t>24/08/2020</a:t>
+              <a:t>27/08/2020</a:t>
             </a:fld>
             <a:endParaRPr lang="en-GB"/>
           </a:p>
@@ -911,7 +911,7 @@
           <a:p>
             <a:fld id="{5C316670-22DA-CE45-BF19-C0B19D676291}" type="datetimeFigureOut">
               <a:rPr lang="en-GB" smtClean="0"/>
-              <a:t>24/08/2020</a:t>
+              <a:t>27/08/2020</a:t>
             </a:fld>
             <a:endParaRPr lang="en-GB"/>
           </a:p>
@@ -1121,7 +1121,7 @@
           <a:p>
             <a:fld id="{5C316670-22DA-CE45-BF19-C0B19D676291}" type="datetimeFigureOut">
               <a:rPr lang="en-GB" smtClean="0"/>
-              <a:t>24/08/2020</a:t>
+              <a:t>27/08/2020</a:t>
             </a:fld>
             <a:endParaRPr lang="en-GB"/>
           </a:p>
@@ -1321,7 +1321,7 @@
           <a:p>
             <a:fld id="{5C316670-22DA-CE45-BF19-C0B19D676291}" type="datetimeFigureOut">
               <a:rPr lang="en-GB" smtClean="0"/>
-              <a:t>24/08/2020</a:t>
+              <a:t>27/08/2020</a:t>
             </a:fld>
             <a:endParaRPr lang="en-GB"/>
           </a:p>
@@ -1597,7 +1597,7 @@
           <a:p>
             <a:fld id="{5C316670-22DA-CE45-BF19-C0B19D676291}" type="datetimeFigureOut">
               <a:rPr lang="en-GB" smtClean="0"/>
-              <a:t>24/08/2020</a:t>
+              <a:t>27/08/2020</a:t>
             </a:fld>
             <a:endParaRPr lang="en-GB"/>
           </a:p>
@@ -1865,7 +1865,7 @@
           <a:p>
             <a:fld id="{5C316670-22DA-CE45-BF19-C0B19D676291}" type="datetimeFigureOut">
               <a:rPr lang="en-GB" smtClean="0"/>
-              <a:t>24/08/2020</a:t>
+              <a:t>27/08/2020</a:t>
             </a:fld>
             <a:endParaRPr lang="en-GB"/>
           </a:p>
@@ -2280,7 +2280,7 @@
           <a:p>
             <a:fld id="{5C316670-22DA-CE45-BF19-C0B19D676291}" type="datetimeFigureOut">
               <a:rPr lang="en-GB" smtClean="0"/>
-              <a:t>24/08/2020</a:t>
+              <a:t>27/08/2020</a:t>
             </a:fld>
             <a:endParaRPr lang="en-GB"/>
           </a:p>
@@ -2422,7 +2422,7 @@
           <a:p>
             <a:fld id="{5C316670-22DA-CE45-BF19-C0B19D676291}" type="datetimeFigureOut">
               <a:rPr lang="en-GB" smtClean="0"/>
-              <a:t>24/08/2020</a:t>
+              <a:t>27/08/2020</a:t>
             </a:fld>
             <a:endParaRPr lang="en-GB"/>
           </a:p>
@@ -2535,7 +2535,7 @@
           <a:p>
             <a:fld id="{5C316670-22DA-CE45-BF19-C0B19D676291}" type="datetimeFigureOut">
               <a:rPr lang="en-GB" smtClean="0"/>
-              <a:t>24/08/2020</a:t>
+              <a:t>27/08/2020</a:t>
             </a:fld>
             <a:endParaRPr lang="en-GB"/>
           </a:p>
@@ -2848,7 +2848,7 @@
           <a:p>
             <a:fld id="{5C316670-22DA-CE45-BF19-C0B19D676291}" type="datetimeFigureOut">
               <a:rPr lang="en-GB" smtClean="0"/>
-              <a:t>24/08/2020</a:t>
+              <a:t>27/08/2020</a:t>
             </a:fld>
             <a:endParaRPr lang="en-GB"/>
           </a:p>
@@ -3137,7 +3137,7 @@
           <a:p>
             <a:fld id="{5C316670-22DA-CE45-BF19-C0B19D676291}" type="datetimeFigureOut">
               <a:rPr lang="en-GB" smtClean="0"/>
-              <a:t>24/08/2020</a:t>
+              <a:t>27/08/2020</a:t>
             </a:fld>
             <a:endParaRPr lang="en-GB"/>
           </a:p>
@@ -3380,7 +3380,7 @@
           <a:p>
             <a:fld id="{5C316670-22DA-CE45-BF19-C0B19D676291}" type="datetimeFigureOut">
               <a:rPr lang="en-GB" smtClean="0"/>
-              <a:t>24/08/2020</a:t>
+              <a:t>27/08/2020</a:t>
             </a:fld>
             <a:endParaRPr lang="en-GB"/>
           </a:p>
@@ -4793,62 +4793,10 @@
       </p:pic>
       <p:sp>
         <p:nvSpPr>
-          <p:cNvPr id="4" name="Oval 3">
+          <p:cNvPr id="2" name="TextBox 1">
             <a:extLst>
               <a:ext uri="{FF2B5EF4-FFF2-40B4-BE49-F238E27FC236}">
-                <a16:creationId xmlns:a16="http://schemas.microsoft.com/office/drawing/2014/main" id="{316832BC-C9C0-1643-BC0B-331B62B57C18}"/>
-              </a:ext>
-            </a:extLst>
-          </p:cNvPr>
-          <p:cNvSpPr/>
-          <p:nvPr/>
-        </p:nvSpPr>
-        <p:spPr>
-          <a:xfrm>
-            <a:off x="7043059" y="342900"/>
-            <a:ext cx="1861457" cy="1050471"/>
-          </a:xfrm>
-          <a:prstGeom prst="ellipse">
-            <a:avLst/>
-          </a:prstGeom>
-          <a:noFill/>
-          <a:ln w="38100">
-            <a:solidFill>
-              <a:srgbClr val="619CFF"/>
-            </a:solidFill>
-          </a:ln>
-        </p:spPr>
-        <p:style>
-          <a:lnRef idx="2">
-            <a:schemeClr val="accent1">
-              <a:shade val="50000"/>
-            </a:schemeClr>
-          </a:lnRef>
-          <a:fillRef idx="1">
-            <a:schemeClr val="accent1"/>
-          </a:fillRef>
-          <a:effectRef idx="0">
-            <a:schemeClr val="accent1"/>
-          </a:effectRef>
-          <a:fontRef idx="minor">
-            <a:schemeClr val="lt1"/>
-          </a:fontRef>
-        </p:style>
-        <p:txBody>
-          <a:bodyPr rtlCol="0" anchor="ctr"/>
-          <a:lstStyle/>
-          <a:p>
-            <a:pPr algn="ctr"/>
-            <a:endParaRPr lang="en-GB"/>
-          </a:p>
-        </p:txBody>
-      </p:sp>
-      <p:sp>
-        <p:nvSpPr>
-          <p:cNvPr id="5" name="TextBox 4">
-            <a:extLst>
-              <a:ext uri="{FF2B5EF4-FFF2-40B4-BE49-F238E27FC236}">
-                <a16:creationId xmlns:a16="http://schemas.microsoft.com/office/drawing/2014/main" id="{2B72C4DF-E662-E244-9975-B9154081A09E}"/>
+                <a16:creationId xmlns:a16="http://schemas.microsoft.com/office/drawing/2014/main" id="{2358ACF7-0E4D-F540-8FB4-A7D50A9353B3}"/>
               </a:ext>
             </a:extLst>
           </p:cNvPr>
@@ -4857,8 +4805,8 @@
         </p:nvSpPr>
         <p:spPr>
           <a:xfrm>
-            <a:off x="9252857" y="342900"/>
-            <a:ext cx="2286000" cy="4524315"/>
+            <a:off x="3183225" y="1817531"/>
+            <a:ext cx="418704" cy="369332"/>
           </a:xfrm>
           <a:prstGeom prst="rect">
             <a:avLst/>
@@ -4866,50 +4814,344 @@
           <a:noFill/>
         </p:spPr>
         <p:txBody>
-          <a:bodyPr wrap="square" rtlCol="0">
+          <a:bodyPr wrap="none" rtlCol="0">
             <a:spAutoFit/>
           </a:bodyPr>
           <a:lstStyle/>
           <a:p>
             <a:r>
-              <a:rPr lang="en-GB" dirty="0"/>
-              <a:t>In CZA WAVE RIGHT there are 23 individuals.</a:t>
-            </a:r>
-          </a:p>
-          <a:p>
-            <a:endParaRPr lang="en-GB" dirty="0"/>
-          </a:p>
-          <a:p>
-            <a:r>
-              <a:rPr lang="en-GB" dirty="0"/>
-              <a:t>Using a filter of 20 individuals per variants, the numbers of polymorphic variants are:</a:t>
-            </a:r>
-          </a:p>
-          <a:p>
-            <a:r>
-              <a:rPr lang="en-GB" dirty="0"/>
-              <a:t>20000 INDELs.</a:t>
-            </a:r>
-          </a:p>
-          <a:p>
-            <a:r>
-              <a:rPr lang="en-GB" dirty="0"/>
-              <a:t>89745 SNPs.</a:t>
-            </a:r>
-          </a:p>
-          <a:p>
-            <a:endParaRPr lang="en-GB" dirty="0"/>
-          </a:p>
-          <a:p>
-            <a:r>
-              <a:rPr lang="en-GB" dirty="0"/>
-              <a:t>These numbers have changed very little. INDELs are five less and </a:t>
-            </a:r>
-            <a:r>
-              <a:rPr lang="en-GB"/>
-              <a:t>SNPs are 25 less.</a:t>
-            </a:r>
-            <a:endParaRPr lang="en-GB" dirty="0"/>
+              <a:rPr lang="en-GB" dirty="0">
+                <a:solidFill>
+                  <a:srgbClr val="F8766C"/>
+                </a:solidFill>
+              </a:rPr>
+              <a:t>69</a:t>
+            </a:r>
+          </a:p>
+        </p:txBody>
+      </p:sp>
+      <p:sp>
+        <p:nvSpPr>
+          <p:cNvPr id="6" name="TextBox 5">
+            <a:extLst>
+              <a:ext uri="{FF2B5EF4-FFF2-40B4-BE49-F238E27FC236}">
+                <a16:creationId xmlns:a16="http://schemas.microsoft.com/office/drawing/2014/main" id="{CE99F707-4686-124C-897D-ABCF4DE3D19A}"/>
+              </a:ext>
+            </a:extLst>
+          </p:cNvPr>
+          <p:cNvSpPr txBox="1"/>
+          <p:nvPr/>
+        </p:nvSpPr>
+        <p:spPr>
+          <a:xfrm>
+            <a:off x="2604550" y="683469"/>
+            <a:ext cx="418704" cy="369332"/>
+          </a:xfrm>
+          <a:prstGeom prst="rect">
+            <a:avLst/>
+          </a:prstGeom>
+          <a:noFill/>
+        </p:spPr>
+        <p:txBody>
+          <a:bodyPr wrap="none" rtlCol="0">
+            <a:spAutoFit/>
+          </a:bodyPr>
+          <a:lstStyle/>
+          <a:p>
+            <a:r>
+              <a:rPr lang="en-GB" dirty="0">
+                <a:solidFill>
+                  <a:srgbClr val="0EBA38"/>
+                </a:solidFill>
+              </a:rPr>
+              <a:t>62</a:t>
+            </a:r>
+          </a:p>
+        </p:txBody>
+      </p:sp>
+      <p:sp>
+        <p:nvSpPr>
+          <p:cNvPr id="7" name="TextBox 6">
+            <a:extLst>
+              <a:ext uri="{FF2B5EF4-FFF2-40B4-BE49-F238E27FC236}">
+                <a16:creationId xmlns:a16="http://schemas.microsoft.com/office/drawing/2014/main" id="{66FC0E91-028C-8249-B594-C251CFF04171}"/>
+              </a:ext>
+            </a:extLst>
+          </p:cNvPr>
+          <p:cNvSpPr txBox="1"/>
+          <p:nvPr/>
+        </p:nvSpPr>
+        <p:spPr>
+          <a:xfrm>
+            <a:off x="3183225" y="3682483"/>
+            <a:ext cx="418704" cy="369332"/>
+          </a:xfrm>
+          <a:prstGeom prst="rect">
+            <a:avLst/>
+          </a:prstGeom>
+          <a:noFill/>
+        </p:spPr>
+        <p:txBody>
+          <a:bodyPr wrap="none" rtlCol="0">
+            <a:spAutoFit/>
+          </a:bodyPr>
+          <a:lstStyle/>
+          <a:p>
+            <a:r>
+              <a:rPr lang="en-GB" dirty="0">
+                <a:solidFill>
+                  <a:srgbClr val="F8766C"/>
+                </a:solidFill>
+              </a:rPr>
+              <a:t>64</a:t>
+            </a:r>
+          </a:p>
+        </p:txBody>
+      </p:sp>
+      <p:sp>
+        <p:nvSpPr>
+          <p:cNvPr id="8" name="TextBox 7">
+            <a:extLst>
+              <a:ext uri="{FF2B5EF4-FFF2-40B4-BE49-F238E27FC236}">
+                <a16:creationId xmlns:a16="http://schemas.microsoft.com/office/drawing/2014/main" id="{BDFB3F2F-79B4-1A44-8BA7-338BBEF294AA}"/>
+              </a:ext>
+            </a:extLst>
+          </p:cNvPr>
+          <p:cNvSpPr txBox="1"/>
+          <p:nvPr/>
+        </p:nvSpPr>
+        <p:spPr>
+          <a:xfrm>
+            <a:off x="3183225" y="5547435"/>
+            <a:ext cx="418704" cy="369332"/>
+          </a:xfrm>
+          <a:prstGeom prst="rect">
+            <a:avLst/>
+          </a:prstGeom>
+          <a:noFill/>
+        </p:spPr>
+        <p:txBody>
+          <a:bodyPr wrap="none" rtlCol="0">
+            <a:spAutoFit/>
+          </a:bodyPr>
+          <a:lstStyle/>
+          <a:p>
+            <a:r>
+              <a:rPr lang="en-GB" dirty="0">
+                <a:solidFill>
+                  <a:srgbClr val="F8766C"/>
+                </a:solidFill>
+              </a:rPr>
+              <a:t>67</a:t>
+            </a:r>
+          </a:p>
+        </p:txBody>
+      </p:sp>
+      <p:sp>
+        <p:nvSpPr>
+          <p:cNvPr id="9" name="TextBox 8">
+            <a:extLst>
+              <a:ext uri="{FF2B5EF4-FFF2-40B4-BE49-F238E27FC236}">
+                <a16:creationId xmlns:a16="http://schemas.microsoft.com/office/drawing/2014/main" id="{CA938858-1A6F-E642-B6D7-7958211856D3}"/>
+              </a:ext>
+            </a:extLst>
+          </p:cNvPr>
+          <p:cNvSpPr txBox="1"/>
+          <p:nvPr/>
+        </p:nvSpPr>
+        <p:spPr>
+          <a:xfrm>
+            <a:off x="2604550" y="3229952"/>
+            <a:ext cx="418704" cy="369332"/>
+          </a:xfrm>
+          <a:prstGeom prst="rect">
+            <a:avLst/>
+          </a:prstGeom>
+          <a:noFill/>
+        </p:spPr>
+        <p:txBody>
+          <a:bodyPr wrap="none" rtlCol="0">
+            <a:spAutoFit/>
+          </a:bodyPr>
+          <a:lstStyle/>
+          <a:p>
+            <a:r>
+              <a:rPr lang="en-GB" dirty="0">
+                <a:solidFill>
+                  <a:srgbClr val="0EBA38"/>
+                </a:solidFill>
+              </a:rPr>
+              <a:t>59</a:t>
+            </a:r>
+          </a:p>
+        </p:txBody>
+      </p:sp>
+      <p:sp>
+        <p:nvSpPr>
+          <p:cNvPr id="10" name="TextBox 9">
+            <a:extLst>
+              <a:ext uri="{FF2B5EF4-FFF2-40B4-BE49-F238E27FC236}">
+                <a16:creationId xmlns:a16="http://schemas.microsoft.com/office/drawing/2014/main" id="{0A0858AB-6AA3-5243-A117-773CE0061DB8}"/>
+              </a:ext>
+            </a:extLst>
+          </p:cNvPr>
+          <p:cNvSpPr txBox="1"/>
+          <p:nvPr/>
+        </p:nvSpPr>
+        <p:spPr>
+          <a:xfrm>
+            <a:off x="2604550" y="4867215"/>
+            <a:ext cx="418704" cy="369332"/>
+          </a:xfrm>
+          <a:prstGeom prst="rect">
+            <a:avLst/>
+          </a:prstGeom>
+          <a:noFill/>
+        </p:spPr>
+        <p:txBody>
+          <a:bodyPr wrap="none" rtlCol="0">
+            <a:spAutoFit/>
+          </a:bodyPr>
+          <a:lstStyle/>
+          <a:p>
+            <a:r>
+              <a:rPr lang="en-GB" dirty="0">
+                <a:solidFill>
+                  <a:srgbClr val="0EBA38"/>
+                </a:solidFill>
+              </a:rPr>
+              <a:t>31</a:t>
+            </a:r>
+          </a:p>
+        </p:txBody>
+      </p:sp>
+      <p:sp>
+        <p:nvSpPr>
+          <p:cNvPr id="11" name="TextBox 10">
+            <a:extLst>
+              <a:ext uri="{FF2B5EF4-FFF2-40B4-BE49-F238E27FC236}">
+                <a16:creationId xmlns:a16="http://schemas.microsoft.com/office/drawing/2014/main" id="{5FC228BA-BC77-6441-8F6D-C5572323BB6E}"/>
+              </a:ext>
+            </a:extLst>
+          </p:cNvPr>
+          <p:cNvSpPr txBox="1"/>
+          <p:nvPr/>
+        </p:nvSpPr>
+        <p:spPr>
+          <a:xfrm>
+            <a:off x="7318064" y="2605057"/>
+            <a:ext cx="418704" cy="369332"/>
+          </a:xfrm>
+          <a:prstGeom prst="rect">
+            <a:avLst/>
+          </a:prstGeom>
+          <a:noFill/>
+        </p:spPr>
+        <p:txBody>
+          <a:bodyPr wrap="none" rtlCol="0">
+            <a:spAutoFit/>
+          </a:bodyPr>
+          <a:lstStyle/>
+          <a:p>
+            <a:r>
+              <a:rPr lang="en-GB" dirty="0">
+                <a:solidFill>
+                  <a:srgbClr val="619CFF"/>
+                </a:solidFill>
+              </a:rPr>
+              <a:t>45</a:t>
+            </a:r>
+          </a:p>
+        </p:txBody>
+      </p:sp>
+      <p:sp>
+        <p:nvSpPr>
+          <p:cNvPr id="12" name="TextBox 11">
+            <a:extLst>
+              <a:ext uri="{FF2B5EF4-FFF2-40B4-BE49-F238E27FC236}">
+                <a16:creationId xmlns:a16="http://schemas.microsoft.com/office/drawing/2014/main" id="{211AEF15-E4E2-5748-BB99-05887933DB15}"/>
+              </a:ext>
+            </a:extLst>
+          </p:cNvPr>
+          <p:cNvSpPr txBox="1"/>
+          <p:nvPr/>
+        </p:nvSpPr>
+        <p:spPr>
+          <a:xfrm>
+            <a:off x="7318064" y="4867215"/>
+            <a:ext cx="418704" cy="369332"/>
+          </a:xfrm>
+          <a:prstGeom prst="rect">
+            <a:avLst/>
+          </a:prstGeom>
+          <a:noFill/>
+        </p:spPr>
+        <p:txBody>
+          <a:bodyPr wrap="none" rtlCol="0">
+            <a:spAutoFit/>
+          </a:bodyPr>
+          <a:lstStyle/>
+          <a:p>
+            <a:r>
+              <a:rPr lang="en-GB" dirty="0">
+                <a:solidFill>
+                  <a:srgbClr val="619CFF"/>
+                </a:solidFill>
+              </a:rPr>
+              <a:t>73</a:t>
+            </a:r>
+          </a:p>
+        </p:txBody>
+      </p:sp>
+      <p:sp>
+        <p:nvSpPr>
+          <p:cNvPr id="13" name="TextBox 12">
+            <a:extLst>
+              <a:ext uri="{FF2B5EF4-FFF2-40B4-BE49-F238E27FC236}">
+                <a16:creationId xmlns:a16="http://schemas.microsoft.com/office/drawing/2014/main" id="{A2ADDBC3-EDB0-2143-9633-0F152DB07C99}"/>
+              </a:ext>
+            </a:extLst>
+          </p:cNvPr>
+          <p:cNvSpPr txBox="1"/>
+          <p:nvPr/>
+        </p:nvSpPr>
+        <p:spPr>
+          <a:xfrm>
+            <a:off x="7318064" y="1326504"/>
+            <a:ext cx="418704" cy="369332"/>
+          </a:xfrm>
+          <a:prstGeom prst="rect">
+            <a:avLst/>
+          </a:prstGeom>
+          <a:noFill/>
+        </p:spPr>
+        <p:txBody>
+          <a:bodyPr wrap="none" rtlCol="0">
+            <a:spAutoFit/>
+          </a:bodyPr>
+          <a:lstStyle/>
+          <a:p>
+            <a:r>
+              <a:rPr lang="en-GB" dirty="0">
+                <a:solidFill>
+                  <a:srgbClr val="619CFF"/>
+                </a:solidFill>
+              </a:rPr>
+              <a:t>2</a:t>
+            </a:r>
+            <a:r>
+              <a:rPr lang="en-GB">
+                <a:solidFill>
+                  <a:srgbClr val="619CFF"/>
+                </a:solidFill>
+              </a:rPr>
+              <a:t>3</a:t>
+            </a:r>
+            <a:endParaRPr lang="en-GB" dirty="0">
+              <a:solidFill>
+                <a:srgbClr val="619CFF"/>
+              </a:solidFill>
+            </a:endParaRPr>
           </a:p>
         </p:txBody>
       </p:sp>
@@ -8492,12 +8734,940 @@
           <a:chExt cx="0" cy="0"/>
         </a:xfrm>
       </p:grpSpPr>
+      <p:graphicFrame>
+        <p:nvGraphicFramePr>
+          <p:cNvPr id="2" name="Table 2">
+            <a:extLst>
+              <a:ext uri="{FF2B5EF4-FFF2-40B4-BE49-F238E27FC236}">
+                <a16:creationId xmlns:a16="http://schemas.microsoft.com/office/drawing/2014/main" id="{4E8E011B-3B23-CF40-BCD3-C4CB7FD8EBE8}"/>
+              </a:ext>
+            </a:extLst>
+          </p:cNvPr>
+          <p:cNvGraphicFramePr>
+            <a:graphicFrameLocks noGrp="1"/>
+          </p:cNvGraphicFramePr>
+          <p:nvPr>
+            <p:extLst>
+              <p:ext uri="{D42A27DB-BD31-4B8C-83A1-F6EECF244321}">
+                <p14:modId xmlns:p14="http://schemas.microsoft.com/office/powerpoint/2010/main" val="1686893740"/>
+              </p:ext>
+            </p:extLst>
+          </p:nvPr>
+        </p:nvGraphicFramePr>
+        <p:xfrm>
+          <a:off x="83458" y="1769535"/>
+          <a:ext cx="5968998" cy="3318930"/>
+        </p:xfrm>
+        <a:graphic>
+          <a:graphicData uri="http://schemas.openxmlformats.org/drawingml/2006/table">
+            <a:tbl>
+              <a:tblPr bandRow="1">
+                <a:tableStyleId>{5C22544A-7EE6-4342-B048-85BDC9FD1C3A}</a:tableStyleId>
+              </a:tblPr>
+              <a:tblGrid>
+                <a:gridCol w="994833">
+                  <a:extLst>
+                    <a:ext uri="{9D8B030D-6E8A-4147-A177-3AD203B41FA5}">
+                      <a16:colId xmlns:a16="http://schemas.microsoft.com/office/drawing/2014/main" val="1122499975"/>
+                    </a:ext>
+                  </a:extLst>
+                </a:gridCol>
+                <a:gridCol w="994833">
+                  <a:extLst>
+                    <a:ext uri="{9D8B030D-6E8A-4147-A177-3AD203B41FA5}">
+                      <a16:colId xmlns:a16="http://schemas.microsoft.com/office/drawing/2014/main" val="3672245095"/>
+                    </a:ext>
+                  </a:extLst>
+                </a:gridCol>
+                <a:gridCol w="994833">
+                  <a:extLst>
+                    <a:ext uri="{9D8B030D-6E8A-4147-A177-3AD203B41FA5}">
+                      <a16:colId xmlns:a16="http://schemas.microsoft.com/office/drawing/2014/main" val="3744831420"/>
+                    </a:ext>
+                  </a:extLst>
+                </a:gridCol>
+                <a:gridCol w="994833">
+                  <a:extLst>
+                    <a:ext uri="{9D8B030D-6E8A-4147-A177-3AD203B41FA5}">
+                      <a16:colId xmlns:a16="http://schemas.microsoft.com/office/drawing/2014/main" val="1670834702"/>
+                    </a:ext>
+                  </a:extLst>
+                </a:gridCol>
+                <a:gridCol w="994833">
+                  <a:extLst>
+                    <a:ext uri="{9D8B030D-6E8A-4147-A177-3AD203B41FA5}">
+                      <a16:colId xmlns:a16="http://schemas.microsoft.com/office/drawing/2014/main" val="337628753"/>
+                    </a:ext>
+                  </a:extLst>
+                </a:gridCol>
+                <a:gridCol w="994833">
+                  <a:extLst>
+                    <a:ext uri="{9D8B030D-6E8A-4147-A177-3AD203B41FA5}">
+                      <a16:colId xmlns:a16="http://schemas.microsoft.com/office/drawing/2014/main" val="3415385851"/>
+                    </a:ext>
+                  </a:extLst>
+                </a:gridCol>
+              </a:tblGrid>
+              <a:tr h="331893">
+                <a:tc>
+                  <a:txBody>
+                    <a:bodyPr/>
+                    <a:lstStyle/>
+                    <a:p>
+                      <a:r>
+                        <a:rPr lang="en-GB" sz="1400" dirty="0"/>
+                        <a:t>Island</a:t>
+                      </a:r>
+                    </a:p>
+                  </a:txBody>
+                  <a:tcPr/>
+                </a:tc>
+                <a:tc>
+                  <a:txBody>
+                    <a:bodyPr/>
+                    <a:lstStyle/>
+                    <a:p>
+                      <a:r>
+                        <a:rPr lang="en-GB" sz="1400" dirty="0"/>
+                        <a:t>Ecotype</a:t>
+                      </a:r>
+                    </a:p>
+                  </a:txBody>
+                  <a:tcPr/>
+                </a:tc>
+                <a:tc>
+                  <a:txBody>
+                    <a:bodyPr/>
+                    <a:lstStyle/>
+                    <a:p>
+                      <a:r>
+                        <a:rPr lang="en-GB" sz="1400" dirty="0"/>
+                        <a:t>N</a:t>
+                      </a:r>
+                    </a:p>
+                  </a:txBody>
+                  <a:tcPr/>
+                </a:tc>
+                <a:tc>
+                  <a:txBody>
+                    <a:bodyPr/>
+                    <a:lstStyle/>
+                    <a:p>
+                      <a:r>
+                        <a:rPr lang="en-GB" sz="1400" dirty="0"/>
+                        <a:t>INDELs</a:t>
+                      </a:r>
+                    </a:p>
+                  </a:txBody>
+                  <a:tcPr/>
+                </a:tc>
+                <a:tc>
+                  <a:txBody>
+                    <a:bodyPr/>
+                    <a:lstStyle/>
+                    <a:p>
+                      <a:r>
+                        <a:rPr lang="en-GB" sz="1400" dirty="0"/>
+                        <a:t>SNPs</a:t>
+                      </a:r>
+                    </a:p>
+                  </a:txBody>
+                  <a:tcPr/>
+                </a:tc>
+                <a:tc>
+                  <a:txBody>
+                    <a:bodyPr/>
+                    <a:lstStyle/>
+                    <a:p>
+                      <a:r>
+                        <a:rPr lang="en-GB" sz="1400" dirty="0"/>
+                        <a:t>TOT</a:t>
+                      </a:r>
+                    </a:p>
+                  </a:txBody>
+                  <a:tcPr/>
+                </a:tc>
+                <a:extLst>
+                  <a:ext uri="{0D108BD9-81ED-4DB2-BD59-A6C34878D82A}">
+                    <a16:rowId xmlns:a16="http://schemas.microsoft.com/office/drawing/2014/main" val="405067872"/>
+                  </a:ext>
+                </a:extLst>
+              </a:tr>
+              <a:tr h="331893">
+                <a:tc>
+                  <a:txBody>
+                    <a:bodyPr/>
+                    <a:lstStyle/>
+                    <a:p>
+                      <a:r>
+                        <a:rPr lang="en-GB" sz="1400" dirty="0"/>
+                        <a:t>CZA</a:t>
+                      </a:r>
+                    </a:p>
+                  </a:txBody>
+                  <a:tcPr/>
+                </a:tc>
+                <a:tc>
+                  <a:txBody>
+                    <a:bodyPr/>
+                    <a:lstStyle/>
+                    <a:p>
+                      <a:r>
+                        <a:rPr lang="en-GB" sz="1400" dirty="0"/>
+                        <a:t>CRAB</a:t>
+                      </a:r>
+                    </a:p>
+                  </a:txBody>
+                  <a:tcPr/>
+                </a:tc>
+                <a:tc>
+                  <a:txBody>
+                    <a:bodyPr/>
+                    <a:lstStyle/>
+                    <a:p>
+                      <a:r>
+                        <a:rPr lang="en-GB" sz="1400" dirty="0"/>
+                        <a:t>69</a:t>
+                      </a:r>
+                    </a:p>
+                  </a:txBody>
+                  <a:tcPr/>
+                </a:tc>
+                <a:tc>
+                  <a:txBody>
+                    <a:bodyPr/>
+                    <a:lstStyle/>
+                    <a:p>
+                      <a:r>
+                        <a:rPr lang="en-GB" sz="1400" dirty="0"/>
+                        <a:t>7977</a:t>
+                      </a:r>
+                    </a:p>
+                  </a:txBody>
+                  <a:tcPr/>
+                </a:tc>
+                <a:tc>
+                  <a:txBody>
+                    <a:bodyPr/>
+                    <a:lstStyle/>
+                    <a:p>
+                      <a:r>
+                        <a:rPr lang="en-GB" sz="1400" dirty="0"/>
+                        <a:t>38304</a:t>
+                      </a:r>
+                    </a:p>
+                  </a:txBody>
+                  <a:tcPr/>
+                </a:tc>
+                <a:tc>
+                  <a:txBody>
+                    <a:bodyPr/>
+                    <a:lstStyle/>
+                    <a:p>
+                      <a:r>
+                        <a:rPr lang="en-GB" sz="1400" dirty="0"/>
+                        <a:t>46281</a:t>
+                      </a:r>
+                    </a:p>
+                  </a:txBody>
+                  <a:tcPr/>
+                </a:tc>
+                <a:extLst>
+                  <a:ext uri="{0D108BD9-81ED-4DB2-BD59-A6C34878D82A}">
+                    <a16:rowId xmlns:a16="http://schemas.microsoft.com/office/drawing/2014/main" val="2580575327"/>
+                  </a:ext>
+                </a:extLst>
+              </a:tr>
+              <a:tr h="331893">
+                <a:tc>
+                  <a:txBody>
+                    <a:bodyPr/>
+                    <a:lstStyle/>
+                    <a:p>
+                      <a:r>
+                        <a:rPr lang="en-GB" sz="1400" dirty="0"/>
+                        <a:t>CZA</a:t>
+                      </a:r>
+                    </a:p>
+                  </a:txBody>
+                  <a:tcPr/>
+                </a:tc>
+                <a:tc>
+                  <a:txBody>
+                    <a:bodyPr/>
+                    <a:lstStyle/>
+                    <a:p>
+                      <a:r>
+                        <a:rPr lang="en-GB" sz="1400" dirty="0"/>
+                        <a:t>WAVE L</a:t>
+                      </a:r>
+                    </a:p>
+                  </a:txBody>
+                  <a:tcPr/>
+                </a:tc>
+                <a:tc>
+                  <a:txBody>
+                    <a:bodyPr/>
+                    <a:lstStyle/>
+                    <a:p>
+                      <a:r>
+                        <a:rPr lang="en-GB" sz="1400" dirty="0"/>
+                        <a:t>62</a:t>
+                      </a:r>
+                    </a:p>
+                  </a:txBody>
+                  <a:tcPr/>
+                </a:tc>
+                <a:tc>
+                  <a:txBody>
+                    <a:bodyPr/>
+                    <a:lstStyle/>
+                    <a:p>
+                      <a:r>
+                        <a:rPr lang="en-GB" sz="1400" dirty="0"/>
+                        <a:t>7836</a:t>
+                      </a:r>
+                    </a:p>
+                  </a:txBody>
+                  <a:tcPr/>
+                </a:tc>
+                <a:tc>
+                  <a:txBody>
+                    <a:bodyPr/>
+                    <a:lstStyle/>
+                    <a:p>
+                      <a:r>
+                        <a:rPr lang="en-GB" sz="1400" dirty="0"/>
+                        <a:t>37843</a:t>
+                      </a:r>
+                    </a:p>
+                  </a:txBody>
+                  <a:tcPr/>
+                </a:tc>
+                <a:tc>
+                  <a:txBody>
+                    <a:bodyPr/>
+                    <a:lstStyle/>
+                    <a:p>
+                      <a:r>
+                        <a:rPr lang="en-GB" sz="1400" dirty="0"/>
+                        <a:t>45679</a:t>
+                      </a:r>
+                    </a:p>
+                  </a:txBody>
+                  <a:tcPr/>
+                </a:tc>
+                <a:extLst>
+                  <a:ext uri="{0D108BD9-81ED-4DB2-BD59-A6C34878D82A}">
+                    <a16:rowId xmlns:a16="http://schemas.microsoft.com/office/drawing/2014/main" val="1193857690"/>
+                  </a:ext>
+                </a:extLst>
+              </a:tr>
+              <a:tr h="331893">
+                <a:tc>
+                  <a:txBody>
+                    <a:bodyPr/>
+                    <a:lstStyle/>
+                    <a:p>
+                      <a:r>
+                        <a:rPr lang="en-GB" sz="1400" dirty="0"/>
+                        <a:t>CZA</a:t>
+                      </a:r>
+                    </a:p>
+                  </a:txBody>
+                  <a:tcPr/>
+                </a:tc>
+                <a:tc>
+                  <a:txBody>
+                    <a:bodyPr/>
+                    <a:lstStyle/>
+                    <a:p>
+                      <a:r>
+                        <a:rPr lang="en-GB" sz="1400" dirty="0"/>
+                        <a:t>WAVE R</a:t>
+                      </a:r>
+                    </a:p>
+                  </a:txBody>
+                  <a:tcPr/>
+                </a:tc>
+                <a:tc>
+                  <a:txBody>
+                    <a:bodyPr/>
+                    <a:lstStyle/>
+                    <a:p>
+                      <a:r>
+                        <a:rPr lang="en-GB" sz="1400" dirty="0"/>
+                        <a:t>23</a:t>
+                      </a:r>
+                    </a:p>
+                  </a:txBody>
+                  <a:tcPr/>
+                </a:tc>
+                <a:tc>
+                  <a:txBody>
+                    <a:bodyPr/>
+                    <a:lstStyle/>
+                    <a:p>
+                      <a:r>
+                        <a:rPr lang="en-GB" sz="1400" dirty="0"/>
+                        <a:t>9352</a:t>
+                      </a:r>
+                    </a:p>
+                  </a:txBody>
+                  <a:tcPr/>
+                </a:tc>
+                <a:tc>
+                  <a:txBody>
+                    <a:bodyPr/>
+                    <a:lstStyle/>
+                    <a:p>
+                      <a:r>
+                        <a:rPr lang="en-GB" sz="1400" dirty="0"/>
+                        <a:t>44548</a:t>
+                      </a:r>
+                    </a:p>
+                  </a:txBody>
+                  <a:tcPr/>
+                </a:tc>
+                <a:tc>
+                  <a:txBody>
+                    <a:bodyPr/>
+                    <a:lstStyle/>
+                    <a:p>
+                      <a:r>
+                        <a:rPr lang="en-GB" sz="1400" dirty="0"/>
+                        <a:t>53900</a:t>
+                      </a:r>
+                    </a:p>
+                  </a:txBody>
+                  <a:tcPr/>
+                </a:tc>
+                <a:extLst>
+                  <a:ext uri="{0D108BD9-81ED-4DB2-BD59-A6C34878D82A}">
+                    <a16:rowId xmlns:a16="http://schemas.microsoft.com/office/drawing/2014/main" val="500052006"/>
+                  </a:ext>
+                </a:extLst>
+              </a:tr>
+              <a:tr h="331893">
+                <a:tc>
+                  <a:txBody>
+                    <a:bodyPr/>
+                    <a:lstStyle/>
+                    <a:p>
+                      <a:r>
+                        <a:rPr lang="en-GB" sz="1400" dirty="0"/>
+                        <a:t>CZB</a:t>
+                      </a:r>
+                    </a:p>
+                  </a:txBody>
+                  <a:tcPr/>
+                </a:tc>
+                <a:tc>
+                  <a:txBody>
+                    <a:bodyPr/>
+                    <a:lstStyle/>
+                    <a:p>
+                      <a:r>
+                        <a:rPr lang="en-GB" sz="1400" dirty="0"/>
+                        <a:t>CRAB</a:t>
+                      </a:r>
+                    </a:p>
+                  </a:txBody>
+                  <a:tcPr/>
+                </a:tc>
+                <a:tc>
+                  <a:txBody>
+                    <a:bodyPr/>
+                    <a:lstStyle/>
+                    <a:p>
+                      <a:r>
+                        <a:rPr lang="en-GB" sz="1400" dirty="0"/>
+                        <a:t>64</a:t>
+                      </a:r>
+                    </a:p>
+                  </a:txBody>
+                  <a:tcPr/>
+                </a:tc>
+                <a:tc>
+                  <a:txBody>
+                    <a:bodyPr/>
+                    <a:lstStyle/>
+                    <a:p>
+                      <a:r>
+                        <a:rPr lang="en-GB" sz="1400" dirty="0"/>
+                        <a:t>9751</a:t>
+                      </a:r>
+                    </a:p>
+                  </a:txBody>
+                  <a:tcPr/>
+                </a:tc>
+                <a:tc>
+                  <a:txBody>
+                    <a:bodyPr/>
+                    <a:lstStyle/>
+                    <a:p>
+                      <a:r>
+                        <a:rPr lang="en-GB" sz="1400" dirty="0"/>
+                        <a:t>46233</a:t>
+                      </a:r>
+                    </a:p>
+                  </a:txBody>
+                  <a:tcPr/>
+                </a:tc>
+                <a:tc>
+                  <a:txBody>
+                    <a:bodyPr/>
+                    <a:lstStyle/>
+                    <a:p>
+                      <a:r>
+                        <a:rPr lang="en-GB" sz="1400" dirty="0"/>
+                        <a:t>55984</a:t>
+                      </a:r>
+                    </a:p>
+                  </a:txBody>
+                  <a:tcPr/>
+                </a:tc>
+                <a:extLst>
+                  <a:ext uri="{0D108BD9-81ED-4DB2-BD59-A6C34878D82A}">
+                    <a16:rowId xmlns:a16="http://schemas.microsoft.com/office/drawing/2014/main" val="980823171"/>
+                  </a:ext>
+                </a:extLst>
+              </a:tr>
+              <a:tr h="331893">
+                <a:tc>
+                  <a:txBody>
+                    <a:bodyPr/>
+                    <a:lstStyle/>
+                    <a:p>
+                      <a:r>
+                        <a:rPr lang="en-GB" sz="1400" dirty="0"/>
+                        <a:t>CZB</a:t>
+                      </a:r>
+                    </a:p>
+                  </a:txBody>
+                  <a:tcPr/>
+                </a:tc>
+                <a:tc>
+                  <a:txBody>
+                    <a:bodyPr/>
+                    <a:lstStyle/>
+                    <a:p>
+                      <a:r>
+                        <a:rPr lang="en-GB" sz="1400" dirty="0"/>
+                        <a:t>WAVE L</a:t>
+                      </a:r>
+                    </a:p>
+                  </a:txBody>
+                  <a:tcPr/>
+                </a:tc>
+                <a:tc>
+                  <a:txBody>
+                    <a:bodyPr/>
+                    <a:lstStyle/>
+                    <a:p>
+                      <a:r>
+                        <a:rPr lang="en-GB" sz="1400" dirty="0"/>
+                        <a:t>59</a:t>
+                      </a:r>
+                    </a:p>
+                  </a:txBody>
+                  <a:tcPr/>
+                </a:tc>
+                <a:tc>
+                  <a:txBody>
+                    <a:bodyPr/>
+                    <a:lstStyle/>
+                    <a:p>
+                      <a:r>
+                        <a:rPr lang="en-GB" sz="1400" dirty="0"/>
+                        <a:t>9394</a:t>
+                      </a:r>
+                    </a:p>
+                  </a:txBody>
+                  <a:tcPr/>
+                </a:tc>
+                <a:tc>
+                  <a:txBody>
+                    <a:bodyPr/>
+                    <a:lstStyle/>
+                    <a:p>
+                      <a:r>
+                        <a:rPr lang="en-GB" sz="1400" dirty="0"/>
+                        <a:t>44480</a:t>
+                      </a:r>
+                    </a:p>
+                  </a:txBody>
+                  <a:tcPr/>
+                </a:tc>
+                <a:tc>
+                  <a:txBody>
+                    <a:bodyPr/>
+                    <a:lstStyle/>
+                    <a:p>
+                      <a:r>
+                        <a:rPr lang="en-GB" sz="1400" dirty="0"/>
+                        <a:t>53874</a:t>
+                      </a:r>
+                    </a:p>
+                  </a:txBody>
+                  <a:tcPr/>
+                </a:tc>
+                <a:extLst>
+                  <a:ext uri="{0D108BD9-81ED-4DB2-BD59-A6C34878D82A}">
+                    <a16:rowId xmlns:a16="http://schemas.microsoft.com/office/drawing/2014/main" val="3233287661"/>
+                  </a:ext>
+                </a:extLst>
+              </a:tr>
+              <a:tr h="331893">
+                <a:tc>
+                  <a:txBody>
+                    <a:bodyPr/>
+                    <a:lstStyle/>
+                    <a:p>
+                      <a:r>
+                        <a:rPr lang="en-GB" sz="1400" dirty="0"/>
+                        <a:t>CZB</a:t>
+                      </a:r>
+                    </a:p>
+                  </a:txBody>
+                  <a:tcPr/>
+                </a:tc>
+                <a:tc>
+                  <a:txBody>
+                    <a:bodyPr/>
+                    <a:lstStyle/>
+                    <a:p>
+                      <a:r>
+                        <a:rPr lang="en-GB" sz="1400" dirty="0"/>
+                        <a:t>WAVE R</a:t>
+                      </a:r>
+                    </a:p>
+                  </a:txBody>
+                  <a:tcPr/>
+                </a:tc>
+                <a:tc>
+                  <a:txBody>
+                    <a:bodyPr/>
+                    <a:lstStyle/>
+                    <a:p>
+                      <a:r>
+                        <a:rPr lang="en-GB" sz="1400" dirty="0"/>
+                        <a:t>45</a:t>
+                      </a:r>
+                    </a:p>
+                  </a:txBody>
+                  <a:tcPr/>
+                </a:tc>
+                <a:tc>
+                  <a:txBody>
+                    <a:bodyPr/>
+                    <a:lstStyle/>
+                    <a:p>
+                      <a:r>
+                        <a:rPr lang="en-GB" sz="1400" dirty="0"/>
+                        <a:t>10311</a:t>
+                      </a:r>
+                    </a:p>
+                  </a:txBody>
+                  <a:tcPr/>
+                </a:tc>
+                <a:tc>
+                  <a:txBody>
+                    <a:bodyPr/>
+                    <a:lstStyle/>
+                    <a:p>
+                      <a:r>
+                        <a:rPr lang="en-GB" sz="1400" dirty="0"/>
+                        <a:t>48558</a:t>
+                      </a:r>
+                    </a:p>
+                  </a:txBody>
+                  <a:tcPr/>
+                </a:tc>
+                <a:tc>
+                  <a:txBody>
+                    <a:bodyPr/>
+                    <a:lstStyle/>
+                    <a:p>
+                      <a:r>
+                        <a:rPr lang="en-GB" sz="1400" dirty="0"/>
+                        <a:t>58869</a:t>
+                      </a:r>
+                    </a:p>
+                  </a:txBody>
+                  <a:tcPr/>
+                </a:tc>
+                <a:extLst>
+                  <a:ext uri="{0D108BD9-81ED-4DB2-BD59-A6C34878D82A}">
+                    <a16:rowId xmlns:a16="http://schemas.microsoft.com/office/drawing/2014/main" val="856716825"/>
+                  </a:ext>
+                </a:extLst>
+              </a:tr>
+              <a:tr h="331893">
+                <a:tc>
+                  <a:txBody>
+                    <a:bodyPr/>
+                    <a:lstStyle/>
+                    <a:p>
+                      <a:r>
+                        <a:rPr lang="en-GB" sz="1400" dirty="0"/>
+                        <a:t>CZD</a:t>
+                      </a:r>
+                    </a:p>
+                  </a:txBody>
+                  <a:tcPr/>
+                </a:tc>
+                <a:tc>
+                  <a:txBody>
+                    <a:bodyPr/>
+                    <a:lstStyle/>
+                    <a:p>
+                      <a:r>
+                        <a:rPr lang="en-GB" sz="1400" dirty="0"/>
+                        <a:t>CRAB</a:t>
+                      </a:r>
+                    </a:p>
+                  </a:txBody>
+                  <a:tcPr/>
+                </a:tc>
+                <a:tc>
+                  <a:txBody>
+                    <a:bodyPr/>
+                    <a:lstStyle/>
+                    <a:p>
+                      <a:r>
+                        <a:rPr lang="en-GB" sz="1400" dirty="0"/>
+                        <a:t>67</a:t>
+                      </a:r>
+                    </a:p>
+                  </a:txBody>
+                  <a:tcPr/>
+                </a:tc>
+                <a:tc>
+                  <a:txBody>
+                    <a:bodyPr/>
+                    <a:lstStyle/>
+                    <a:p>
+                      <a:r>
+                        <a:rPr lang="en-GB" sz="1400" dirty="0"/>
+                        <a:t>9764</a:t>
+                      </a:r>
+                    </a:p>
+                  </a:txBody>
+                  <a:tcPr/>
+                </a:tc>
+                <a:tc>
+                  <a:txBody>
+                    <a:bodyPr/>
+                    <a:lstStyle/>
+                    <a:p>
+                      <a:r>
+                        <a:rPr lang="en-GB" sz="1400" dirty="0"/>
+                        <a:t>46659</a:t>
+                      </a:r>
+                    </a:p>
+                  </a:txBody>
+                  <a:tcPr/>
+                </a:tc>
+                <a:tc>
+                  <a:txBody>
+                    <a:bodyPr/>
+                    <a:lstStyle/>
+                    <a:p>
+                      <a:r>
+                        <a:rPr lang="en-GB" sz="1400" dirty="0"/>
+                        <a:t>56423</a:t>
+                      </a:r>
+                    </a:p>
+                  </a:txBody>
+                  <a:tcPr/>
+                </a:tc>
+                <a:extLst>
+                  <a:ext uri="{0D108BD9-81ED-4DB2-BD59-A6C34878D82A}">
+                    <a16:rowId xmlns:a16="http://schemas.microsoft.com/office/drawing/2014/main" val="3665707619"/>
+                  </a:ext>
+                </a:extLst>
+              </a:tr>
+              <a:tr h="331893">
+                <a:tc>
+                  <a:txBody>
+                    <a:bodyPr/>
+                    <a:lstStyle/>
+                    <a:p>
+                      <a:r>
+                        <a:rPr lang="en-GB" sz="1400" dirty="0"/>
+                        <a:t>CZD</a:t>
+                      </a:r>
+                    </a:p>
+                  </a:txBody>
+                  <a:tcPr/>
+                </a:tc>
+                <a:tc>
+                  <a:txBody>
+                    <a:bodyPr/>
+                    <a:lstStyle/>
+                    <a:p>
+                      <a:r>
+                        <a:rPr lang="en-GB" sz="1400" dirty="0"/>
+                        <a:t>WAVE L</a:t>
+                      </a:r>
+                    </a:p>
+                  </a:txBody>
+                  <a:tcPr/>
+                </a:tc>
+                <a:tc>
+                  <a:txBody>
+                    <a:bodyPr/>
+                    <a:lstStyle/>
+                    <a:p>
+                      <a:r>
+                        <a:rPr lang="en-GB" sz="1400" dirty="0"/>
+                        <a:t>31</a:t>
+                      </a:r>
+                    </a:p>
+                  </a:txBody>
+                  <a:tcPr/>
+                </a:tc>
+                <a:tc>
+                  <a:txBody>
+                    <a:bodyPr/>
+                    <a:lstStyle/>
+                    <a:p>
+                      <a:r>
+                        <a:rPr lang="en-GB" sz="1400" dirty="0"/>
+                        <a:t>10864</a:t>
+                      </a:r>
+                    </a:p>
+                  </a:txBody>
+                  <a:tcPr/>
+                </a:tc>
+                <a:tc>
+                  <a:txBody>
+                    <a:bodyPr/>
+                    <a:lstStyle/>
+                    <a:p>
+                      <a:r>
+                        <a:rPr lang="en-GB" sz="1400" dirty="0"/>
+                        <a:t>51446</a:t>
+                      </a:r>
+                    </a:p>
+                  </a:txBody>
+                  <a:tcPr/>
+                </a:tc>
+                <a:tc>
+                  <a:txBody>
+                    <a:bodyPr/>
+                    <a:lstStyle/>
+                    <a:p>
+                      <a:r>
+                        <a:rPr lang="en-GB" sz="1400" dirty="0"/>
+                        <a:t>62310</a:t>
+                      </a:r>
+                    </a:p>
+                  </a:txBody>
+                  <a:tcPr/>
+                </a:tc>
+                <a:extLst>
+                  <a:ext uri="{0D108BD9-81ED-4DB2-BD59-A6C34878D82A}">
+                    <a16:rowId xmlns:a16="http://schemas.microsoft.com/office/drawing/2014/main" val="4055182826"/>
+                  </a:ext>
+                </a:extLst>
+              </a:tr>
+              <a:tr h="331893">
+                <a:tc>
+                  <a:txBody>
+                    <a:bodyPr/>
+                    <a:lstStyle/>
+                    <a:p>
+                      <a:r>
+                        <a:rPr lang="en-GB" sz="1400" dirty="0"/>
+                        <a:t>CZD</a:t>
+                      </a:r>
+                    </a:p>
+                  </a:txBody>
+                  <a:tcPr/>
+                </a:tc>
+                <a:tc>
+                  <a:txBody>
+                    <a:bodyPr/>
+                    <a:lstStyle/>
+                    <a:p>
+                      <a:r>
+                        <a:rPr lang="en-GB" sz="1400" dirty="0"/>
+                        <a:t>WAVE R</a:t>
+                      </a:r>
+                    </a:p>
+                  </a:txBody>
+                  <a:tcPr/>
+                </a:tc>
+                <a:tc>
+                  <a:txBody>
+                    <a:bodyPr/>
+                    <a:lstStyle/>
+                    <a:p>
+                      <a:r>
+                        <a:rPr lang="en-GB" sz="1400" dirty="0"/>
+                        <a:t>73</a:t>
+                      </a:r>
+                    </a:p>
+                  </a:txBody>
+                  <a:tcPr/>
+                </a:tc>
+                <a:tc>
+                  <a:txBody>
+                    <a:bodyPr/>
+                    <a:lstStyle/>
+                    <a:p>
+                      <a:r>
+                        <a:rPr lang="en-GB" sz="1400" dirty="0"/>
+                        <a:t>9732</a:t>
+                      </a:r>
+                    </a:p>
+                  </a:txBody>
+                  <a:tcPr/>
+                </a:tc>
+                <a:tc>
+                  <a:txBody>
+                    <a:bodyPr/>
+                    <a:lstStyle/>
+                    <a:p>
+                      <a:r>
+                        <a:rPr lang="en-GB" sz="1400" dirty="0"/>
+                        <a:t>46449</a:t>
+                      </a:r>
+                    </a:p>
+                  </a:txBody>
+                  <a:tcPr/>
+                </a:tc>
+                <a:tc>
+                  <a:txBody>
+                    <a:bodyPr/>
+                    <a:lstStyle/>
+                    <a:p>
+                      <a:r>
+                        <a:rPr lang="en-GB" sz="1400" dirty="0"/>
+                        <a:t>56181</a:t>
+                      </a:r>
+                    </a:p>
+                  </a:txBody>
+                  <a:tcPr/>
+                </a:tc>
+                <a:extLst>
+                  <a:ext uri="{0D108BD9-81ED-4DB2-BD59-A6C34878D82A}">
+                    <a16:rowId xmlns:a16="http://schemas.microsoft.com/office/drawing/2014/main" val="2443884119"/>
+                  </a:ext>
+                </a:extLst>
+              </a:tr>
+            </a:tbl>
+          </a:graphicData>
+        </a:graphic>
+      </p:graphicFrame>
       <p:sp>
         <p:nvSpPr>
           <p:cNvPr id="5" name="TextBox 4">
             <a:extLst>
               <a:ext uri="{FF2B5EF4-FFF2-40B4-BE49-F238E27FC236}">
-                <a16:creationId xmlns:a16="http://schemas.microsoft.com/office/drawing/2014/main" id="{049B477E-5E39-F240-86CA-65F077DF0726}"/>
+                <a16:creationId xmlns:a16="http://schemas.microsoft.com/office/drawing/2014/main" id="{43772F90-F9EF-9D47-8D3A-E1BBA6B64DA0}"/>
               </a:ext>
             </a:extLst>
           </p:cNvPr>
@@ -8506,8 +9676,8 @@
         </p:nvSpPr>
         <p:spPr>
           <a:xfrm>
-            <a:off x="528115" y="1100078"/>
-            <a:ext cx="4043885" cy="923330"/>
+            <a:off x="478971" y="424543"/>
+            <a:ext cx="2365071" cy="369332"/>
           </a:xfrm>
           <a:prstGeom prst="rect">
             <a:avLst/>
@@ -8515,7 +9685,7 @@
           <a:noFill/>
         </p:spPr>
         <p:txBody>
-          <a:bodyPr wrap="square" rtlCol="0">
+          <a:bodyPr wrap="none" rtlCol="0">
             <a:spAutoFit/>
           </a:bodyPr>
           <a:lstStyle/>
@@ -8526,208 +9696,943 @@
             </a:pPr>
             <a:r>
               <a:rPr lang="en-GB" dirty="0"/>
-              <a:t>Relative proportion of INDELs and SNPs after filtering but before cline analysis</a:t>
+              <a:t>Fixed + polymorphic</a:t>
             </a:r>
           </a:p>
         </p:txBody>
       </p:sp>
-      <p:pic>
-        <p:nvPicPr>
-          <p:cNvPr id="6" name="Picture 5">
+      <p:graphicFrame>
+        <p:nvGraphicFramePr>
+          <p:cNvPr id="6" name="Table 2">
             <a:extLst>
               <a:ext uri="{FF2B5EF4-FFF2-40B4-BE49-F238E27FC236}">
-                <a16:creationId xmlns:a16="http://schemas.microsoft.com/office/drawing/2014/main" id="{D2406132-7F29-DE47-9F1D-99E2F356F2B5}"/>
+                <a16:creationId xmlns:a16="http://schemas.microsoft.com/office/drawing/2014/main" id="{A0E2C456-F7F4-E743-A8C2-D121D6D0E810}"/>
               </a:ext>
             </a:extLst>
           </p:cNvPr>
-          <p:cNvPicPr>
-            <a:picLocks noChangeAspect="1"/>
-          </p:cNvPicPr>
-          <p:nvPr/>
-        </p:nvPicPr>
-        <p:blipFill>
-          <a:blip r:embed="rId2"/>
-          <a:stretch>
-            <a:fillRect/>
-          </a:stretch>
-        </p:blipFill>
-        <p:spPr>
-          <a:xfrm>
-            <a:off x="4572000" y="0"/>
-            <a:ext cx="7620000" cy="6858000"/>
-          </a:xfrm>
-          <a:prstGeom prst="rect">
-            <a:avLst/>
-          </a:prstGeom>
-        </p:spPr>
-      </p:pic>
-      <p:sp>
-        <p:nvSpPr>
-          <p:cNvPr id="8" name="Rectangle 7">
-            <a:extLst>
-              <a:ext uri="{FF2B5EF4-FFF2-40B4-BE49-F238E27FC236}">
-                <a16:creationId xmlns:a16="http://schemas.microsoft.com/office/drawing/2014/main" id="{D5BBA663-3347-E442-9873-012E62E37C07}"/>
-              </a:ext>
-            </a:extLst>
-          </p:cNvPr>
-          <p:cNvSpPr/>
-          <p:nvPr/>
-        </p:nvSpPr>
-        <p:spPr>
-          <a:xfrm>
-            <a:off x="397486" y="409596"/>
-            <a:ext cx="4415696" cy="369332"/>
-          </a:xfrm>
-          <a:prstGeom prst="rect">
-            <a:avLst/>
-          </a:prstGeom>
-        </p:spPr>
-        <p:txBody>
-          <a:bodyPr wrap="none">
-            <a:spAutoFit/>
-          </a:bodyPr>
-          <a:lstStyle/>
-          <a:p>
-            <a:pPr marL="342900" indent="-342900">
-              <a:buFont typeface="+mj-lt"/>
-              <a:buAutoNum type="arabicPeriod" startAt="2"/>
-            </a:pPr>
-            <a:r>
-              <a:rPr lang="en-GB" b="1" dirty="0"/>
-              <a:t>Unfolded allele frequency spectra (</a:t>
-            </a:r>
-            <a:r>
-              <a:rPr lang="en-GB" b="1" dirty="0" err="1"/>
-              <a:t>uAFS</a:t>
-            </a:r>
-            <a:r>
-              <a:rPr lang="en-GB" b="1" dirty="0"/>
-              <a:t>)</a:t>
-            </a:r>
-          </a:p>
-        </p:txBody>
-      </p:sp>
-      <p:sp>
-        <p:nvSpPr>
-          <p:cNvPr id="9" name="TextBox 8">
-            <a:extLst>
-              <a:ext uri="{FF2B5EF4-FFF2-40B4-BE49-F238E27FC236}">
-                <a16:creationId xmlns:a16="http://schemas.microsoft.com/office/drawing/2014/main" id="{5FBC7557-72FC-A44A-909B-8CF5D04F3729}"/>
-              </a:ext>
-            </a:extLst>
-          </p:cNvPr>
-          <p:cNvSpPr txBox="1"/>
-          <p:nvPr/>
-        </p:nvSpPr>
-        <p:spPr>
-          <a:xfrm>
-            <a:off x="462801" y="2188649"/>
-            <a:ext cx="4043885" cy="646331"/>
-          </a:xfrm>
-          <a:prstGeom prst="rect">
-            <a:avLst/>
-          </a:prstGeom>
-          <a:noFill/>
-        </p:spPr>
-        <p:txBody>
-          <a:bodyPr wrap="square" rtlCol="0">
-            <a:spAutoFit/>
-          </a:bodyPr>
-          <a:lstStyle/>
-          <a:p>
-            <a:pPr marL="285750" indent="-285750">
-              <a:buFont typeface="Arial" panose="020B0604020202020204" pitchFamily="34" charset="0"/>
-              <a:buChar char="•"/>
-            </a:pPr>
-            <a:r>
-              <a:rPr lang="en-GB" dirty="0"/>
-              <a:t>Kept variants inside and outside inversions</a:t>
-            </a:r>
-          </a:p>
-        </p:txBody>
-      </p:sp>
-      <p:sp>
-        <p:nvSpPr>
-          <p:cNvPr id="10" name="TextBox 9">
-            <a:extLst>
-              <a:ext uri="{FF2B5EF4-FFF2-40B4-BE49-F238E27FC236}">
-                <a16:creationId xmlns:a16="http://schemas.microsoft.com/office/drawing/2014/main" id="{E53CA946-899C-FB48-983D-C9AE10CE10FB}"/>
-              </a:ext>
-            </a:extLst>
-          </p:cNvPr>
-          <p:cNvSpPr txBox="1"/>
-          <p:nvPr/>
-        </p:nvSpPr>
-        <p:spPr>
-          <a:xfrm>
-            <a:off x="528114" y="3000221"/>
-            <a:ext cx="4043885" cy="2308324"/>
-          </a:xfrm>
-          <a:prstGeom prst="rect">
-            <a:avLst/>
-          </a:prstGeom>
-          <a:noFill/>
-        </p:spPr>
-        <p:txBody>
-          <a:bodyPr wrap="square" rtlCol="0">
-            <a:spAutoFit/>
-          </a:bodyPr>
-          <a:lstStyle/>
-          <a:p>
-            <a:pPr marL="285750" indent="-285750">
-              <a:buFont typeface="Arial" panose="020B0604020202020204" pitchFamily="34" charset="0"/>
-              <a:buChar char="•"/>
-            </a:pPr>
-            <a:r>
-              <a:rPr lang="en-GB" dirty="0"/>
-              <a:t>Two-sample Kolmogorov-Smirnov test</a:t>
-            </a:r>
-            <a:br>
-              <a:rPr lang="en-GB" dirty="0"/>
-            </a:br>
-            <a:r>
-              <a:rPr lang="en-GB" dirty="0"/>
-              <a:t>Null hypothesis:</a:t>
-            </a:r>
-            <a:br>
-              <a:rPr lang="en-GB" dirty="0"/>
-            </a:br>
-            <a:r>
-              <a:rPr lang="en-GB" dirty="0"/>
-              <a:t>INDELs and SNPs </a:t>
-            </a:r>
-            <a:r>
-              <a:rPr lang="en-US" dirty="0"/>
-              <a:t>are drawn from the same continuous distribution</a:t>
-            </a:r>
-            <a:endParaRPr lang="en-GB" dirty="0"/>
-          </a:p>
-          <a:p>
-            <a:pPr marL="742950" lvl="1" indent="-285750">
-              <a:buFont typeface="Arial" panose="020B0604020202020204" pitchFamily="34" charset="0"/>
-              <a:buChar char="•"/>
-            </a:pPr>
-            <a:r>
-              <a:rPr lang="en-GB" dirty="0"/>
-              <a:t>Using relative proportions, the null cannot be rejected</a:t>
-            </a:r>
-          </a:p>
-          <a:p>
-            <a:pPr marL="742950" lvl="1" indent="-285750">
-              <a:buFont typeface="Arial" panose="020B0604020202020204" pitchFamily="34" charset="0"/>
-              <a:buChar char="•"/>
-            </a:pPr>
-            <a:r>
-              <a:rPr lang="en-GB" dirty="0"/>
-              <a:t>Using square root counts, the null can be rejected</a:t>
-            </a:r>
-          </a:p>
-        </p:txBody>
-      </p:sp>
+          <p:cNvGraphicFramePr>
+            <a:graphicFrameLocks noGrp="1"/>
+          </p:cNvGraphicFramePr>
+          <p:nvPr>
+            <p:extLst>
+              <p:ext uri="{D42A27DB-BD31-4B8C-83A1-F6EECF244321}">
+                <p14:modId xmlns:p14="http://schemas.microsoft.com/office/powerpoint/2010/main" val="1354552893"/>
+              </p:ext>
+            </p:extLst>
+          </p:nvPr>
+        </p:nvGraphicFramePr>
+        <p:xfrm>
+          <a:off x="6168572" y="1769535"/>
+          <a:ext cx="5968998" cy="3318930"/>
+        </p:xfrm>
+        <a:graphic>
+          <a:graphicData uri="http://schemas.openxmlformats.org/drawingml/2006/table">
+            <a:tbl>
+              <a:tblPr bandRow="1">
+                <a:tableStyleId>{5C22544A-7EE6-4342-B048-85BDC9FD1C3A}</a:tableStyleId>
+              </a:tblPr>
+              <a:tblGrid>
+                <a:gridCol w="994833">
+                  <a:extLst>
+                    <a:ext uri="{9D8B030D-6E8A-4147-A177-3AD203B41FA5}">
+                      <a16:colId xmlns:a16="http://schemas.microsoft.com/office/drawing/2014/main" val="1122499975"/>
+                    </a:ext>
+                  </a:extLst>
+                </a:gridCol>
+                <a:gridCol w="994833">
+                  <a:extLst>
+                    <a:ext uri="{9D8B030D-6E8A-4147-A177-3AD203B41FA5}">
+                      <a16:colId xmlns:a16="http://schemas.microsoft.com/office/drawing/2014/main" val="3672245095"/>
+                    </a:ext>
+                  </a:extLst>
+                </a:gridCol>
+                <a:gridCol w="994833">
+                  <a:extLst>
+                    <a:ext uri="{9D8B030D-6E8A-4147-A177-3AD203B41FA5}">
+                      <a16:colId xmlns:a16="http://schemas.microsoft.com/office/drawing/2014/main" val="3744831420"/>
+                    </a:ext>
+                  </a:extLst>
+                </a:gridCol>
+                <a:gridCol w="994833">
+                  <a:extLst>
+                    <a:ext uri="{9D8B030D-6E8A-4147-A177-3AD203B41FA5}">
+                      <a16:colId xmlns:a16="http://schemas.microsoft.com/office/drawing/2014/main" val="1670834702"/>
+                    </a:ext>
+                  </a:extLst>
+                </a:gridCol>
+                <a:gridCol w="994833">
+                  <a:extLst>
+                    <a:ext uri="{9D8B030D-6E8A-4147-A177-3AD203B41FA5}">
+                      <a16:colId xmlns:a16="http://schemas.microsoft.com/office/drawing/2014/main" val="337628753"/>
+                    </a:ext>
+                  </a:extLst>
+                </a:gridCol>
+                <a:gridCol w="994833">
+                  <a:extLst>
+                    <a:ext uri="{9D8B030D-6E8A-4147-A177-3AD203B41FA5}">
+                      <a16:colId xmlns:a16="http://schemas.microsoft.com/office/drawing/2014/main" val="3415385851"/>
+                    </a:ext>
+                  </a:extLst>
+                </a:gridCol>
+              </a:tblGrid>
+              <a:tr h="331893">
+                <a:tc>
+                  <a:txBody>
+                    <a:bodyPr/>
+                    <a:lstStyle/>
+                    <a:p>
+                      <a:r>
+                        <a:rPr lang="en-GB" sz="1400" dirty="0"/>
+                        <a:t>Island</a:t>
+                      </a:r>
+                    </a:p>
+                  </a:txBody>
+                  <a:tcPr/>
+                </a:tc>
+                <a:tc>
+                  <a:txBody>
+                    <a:bodyPr/>
+                    <a:lstStyle/>
+                    <a:p>
+                      <a:r>
+                        <a:rPr lang="en-GB" sz="1400" dirty="0"/>
+                        <a:t>Ecotype</a:t>
+                      </a:r>
+                    </a:p>
+                  </a:txBody>
+                  <a:tcPr/>
+                </a:tc>
+                <a:tc>
+                  <a:txBody>
+                    <a:bodyPr/>
+                    <a:lstStyle/>
+                    <a:p>
+                      <a:r>
+                        <a:rPr lang="en-GB" sz="1400" dirty="0"/>
+                        <a:t>N-1</a:t>
+                      </a:r>
+                    </a:p>
+                  </a:txBody>
+                  <a:tcPr/>
+                </a:tc>
+                <a:tc>
+                  <a:txBody>
+                    <a:bodyPr/>
+                    <a:lstStyle/>
+                    <a:p>
+                      <a:r>
+                        <a:rPr lang="en-GB" sz="1400" dirty="0"/>
+                        <a:t>INDELs</a:t>
+                      </a:r>
+                    </a:p>
+                  </a:txBody>
+                  <a:tcPr/>
+                </a:tc>
+                <a:tc>
+                  <a:txBody>
+                    <a:bodyPr/>
+                    <a:lstStyle/>
+                    <a:p>
+                      <a:r>
+                        <a:rPr lang="en-GB" sz="1400" dirty="0"/>
+                        <a:t>SNPs</a:t>
+                      </a:r>
+                    </a:p>
+                  </a:txBody>
+                  <a:tcPr/>
+                </a:tc>
+                <a:tc>
+                  <a:txBody>
+                    <a:bodyPr/>
+                    <a:lstStyle/>
+                    <a:p>
+                      <a:r>
+                        <a:rPr lang="en-GB" sz="1400" dirty="0"/>
+                        <a:t>TOT</a:t>
+                      </a:r>
+                    </a:p>
+                  </a:txBody>
+                  <a:tcPr/>
+                </a:tc>
+                <a:extLst>
+                  <a:ext uri="{0D108BD9-81ED-4DB2-BD59-A6C34878D82A}">
+                    <a16:rowId xmlns:a16="http://schemas.microsoft.com/office/drawing/2014/main" val="405067872"/>
+                  </a:ext>
+                </a:extLst>
+              </a:tr>
+              <a:tr h="331893">
+                <a:tc>
+                  <a:txBody>
+                    <a:bodyPr/>
+                    <a:lstStyle/>
+                    <a:p>
+                      <a:r>
+                        <a:rPr lang="en-GB" sz="1400" dirty="0"/>
+                        <a:t>CZA</a:t>
+                      </a:r>
+                    </a:p>
+                  </a:txBody>
+                  <a:tcPr/>
+                </a:tc>
+                <a:tc>
+                  <a:txBody>
+                    <a:bodyPr/>
+                    <a:lstStyle/>
+                    <a:p>
+                      <a:r>
+                        <a:rPr lang="en-GB" sz="1400" dirty="0"/>
+                        <a:t>CRAB</a:t>
+                      </a:r>
+                    </a:p>
+                  </a:txBody>
+                  <a:tcPr/>
+                </a:tc>
+                <a:tc>
+                  <a:txBody>
+                    <a:bodyPr/>
+                    <a:lstStyle/>
+                    <a:p>
+                      <a:r>
+                        <a:rPr lang="en-GB" sz="1400" dirty="0"/>
+                        <a:t>68</a:t>
+                      </a:r>
+                    </a:p>
+                  </a:txBody>
+                  <a:tcPr/>
+                </a:tc>
+                <a:tc>
+                  <a:txBody>
+                    <a:bodyPr/>
+                    <a:lstStyle/>
+                    <a:p>
+                      <a:r>
+                        <a:rPr lang="en-GB" sz="1400" dirty="0"/>
+                        <a:t>9180</a:t>
+                      </a:r>
+                    </a:p>
+                  </a:txBody>
+                  <a:tcPr/>
+                </a:tc>
+                <a:tc>
+                  <a:txBody>
+                    <a:bodyPr/>
+                    <a:lstStyle/>
+                    <a:p>
+                      <a:r>
+                        <a:rPr lang="en-GB" sz="1400" dirty="0"/>
+                        <a:t>43755</a:t>
+                      </a:r>
+                    </a:p>
+                  </a:txBody>
+                  <a:tcPr/>
+                </a:tc>
+                <a:tc>
+                  <a:txBody>
+                    <a:bodyPr/>
+                    <a:lstStyle/>
+                    <a:p>
+                      <a:r>
+                        <a:rPr lang="en-GB" sz="1400" dirty="0"/>
+                        <a:t>52935</a:t>
+                      </a:r>
+                    </a:p>
+                  </a:txBody>
+                  <a:tcPr/>
+                </a:tc>
+                <a:extLst>
+                  <a:ext uri="{0D108BD9-81ED-4DB2-BD59-A6C34878D82A}">
+                    <a16:rowId xmlns:a16="http://schemas.microsoft.com/office/drawing/2014/main" val="2580575327"/>
+                  </a:ext>
+                </a:extLst>
+              </a:tr>
+              <a:tr h="331893">
+                <a:tc>
+                  <a:txBody>
+                    <a:bodyPr/>
+                    <a:lstStyle/>
+                    <a:p>
+                      <a:r>
+                        <a:rPr lang="en-GB" sz="1400" dirty="0"/>
+                        <a:t>CZA</a:t>
+                      </a:r>
+                    </a:p>
+                  </a:txBody>
+                  <a:tcPr/>
+                </a:tc>
+                <a:tc>
+                  <a:txBody>
+                    <a:bodyPr/>
+                    <a:lstStyle/>
+                    <a:p>
+                      <a:r>
+                        <a:rPr lang="en-GB" sz="1400" dirty="0"/>
+                        <a:t>WAVE L</a:t>
+                      </a:r>
+                    </a:p>
+                  </a:txBody>
+                  <a:tcPr/>
+                </a:tc>
+                <a:tc>
+                  <a:txBody>
+                    <a:bodyPr/>
+                    <a:lstStyle/>
+                    <a:p>
+                      <a:r>
+                        <a:rPr lang="en-GB" sz="1400" dirty="0"/>
+                        <a:t>61</a:t>
+                      </a:r>
+                    </a:p>
+                  </a:txBody>
+                  <a:tcPr/>
+                </a:tc>
+                <a:tc>
+                  <a:txBody>
+                    <a:bodyPr/>
+                    <a:lstStyle/>
+                    <a:p>
+                      <a:r>
+                        <a:rPr lang="en-GB" sz="1400" dirty="0"/>
+                        <a:t>9114</a:t>
+                      </a:r>
+                    </a:p>
+                  </a:txBody>
+                  <a:tcPr/>
+                </a:tc>
+                <a:tc>
+                  <a:txBody>
+                    <a:bodyPr/>
+                    <a:lstStyle/>
+                    <a:p>
+                      <a:r>
+                        <a:rPr lang="en-GB" sz="1400" dirty="0"/>
+                        <a:t>43474</a:t>
+                      </a:r>
+                    </a:p>
+                  </a:txBody>
+                  <a:tcPr/>
+                </a:tc>
+                <a:tc>
+                  <a:txBody>
+                    <a:bodyPr/>
+                    <a:lstStyle/>
+                    <a:p>
+                      <a:r>
+                        <a:rPr lang="en-GB" sz="1400" dirty="0"/>
+                        <a:t>52588</a:t>
+                      </a:r>
+                    </a:p>
+                  </a:txBody>
+                  <a:tcPr/>
+                </a:tc>
+                <a:extLst>
+                  <a:ext uri="{0D108BD9-81ED-4DB2-BD59-A6C34878D82A}">
+                    <a16:rowId xmlns:a16="http://schemas.microsoft.com/office/drawing/2014/main" val="1193857690"/>
+                  </a:ext>
+                </a:extLst>
+              </a:tr>
+              <a:tr h="331893">
+                <a:tc>
+                  <a:txBody>
+                    <a:bodyPr/>
+                    <a:lstStyle/>
+                    <a:p>
+                      <a:r>
+                        <a:rPr lang="en-GB" sz="1400" dirty="0"/>
+                        <a:t>CZA</a:t>
+                      </a:r>
+                    </a:p>
+                  </a:txBody>
+                  <a:tcPr/>
+                </a:tc>
+                <a:tc>
+                  <a:txBody>
+                    <a:bodyPr/>
+                    <a:lstStyle/>
+                    <a:p>
+                      <a:r>
+                        <a:rPr lang="en-GB" sz="1400" dirty="0"/>
+                        <a:t>WAVE R</a:t>
+                      </a:r>
+                    </a:p>
+                  </a:txBody>
+                  <a:tcPr/>
+                </a:tc>
+                <a:tc>
+                  <a:txBody>
+                    <a:bodyPr/>
+                    <a:lstStyle/>
+                    <a:p>
+                      <a:r>
+                        <a:rPr lang="en-GB" sz="1400" dirty="0"/>
+                        <a:t>22</a:t>
+                      </a:r>
+                    </a:p>
+                  </a:txBody>
+                  <a:tcPr/>
+                </a:tc>
+                <a:tc>
+                  <a:txBody>
+                    <a:bodyPr/>
+                    <a:lstStyle/>
+                    <a:p>
+                      <a:r>
+                        <a:rPr lang="en-GB" sz="1400" dirty="0"/>
+                        <a:t>10859</a:t>
+                      </a:r>
+                    </a:p>
+                  </a:txBody>
+                  <a:tcPr/>
+                </a:tc>
+                <a:tc>
+                  <a:txBody>
+                    <a:bodyPr/>
+                    <a:lstStyle/>
+                    <a:p>
+                      <a:r>
+                        <a:rPr lang="en-GB" sz="1400" dirty="0"/>
+                        <a:t>51438</a:t>
+                      </a:r>
+                    </a:p>
+                  </a:txBody>
+                  <a:tcPr/>
+                </a:tc>
+                <a:tc>
+                  <a:txBody>
+                    <a:bodyPr/>
+                    <a:lstStyle/>
+                    <a:p>
+                      <a:r>
+                        <a:rPr lang="en-GB" sz="1400" dirty="0"/>
+                        <a:t>62297</a:t>
+                      </a:r>
+                    </a:p>
+                  </a:txBody>
+                  <a:tcPr/>
+                </a:tc>
+                <a:extLst>
+                  <a:ext uri="{0D108BD9-81ED-4DB2-BD59-A6C34878D82A}">
+                    <a16:rowId xmlns:a16="http://schemas.microsoft.com/office/drawing/2014/main" val="500052006"/>
+                  </a:ext>
+                </a:extLst>
+              </a:tr>
+              <a:tr h="331893">
+                <a:tc>
+                  <a:txBody>
+                    <a:bodyPr/>
+                    <a:lstStyle/>
+                    <a:p>
+                      <a:r>
+                        <a:rPr lang="en-GB" sz="1400" dirty="0"/>
+                        <a:t>CZB</a:t>
+                      </a:r>
+                    </a:p>
+                  </a:txBody>
+                  <a:tcPr/>
+                </a:tc>
+                <a:tc>
+                  <a:txBody>
+                    <a:bodyPr/>
+                    <a:lstStyle/>
+                    <a:p>
+                      <a:r>
+                        <a:rPr lang="en-GB" sz="1400" dirty="0"/>
+                        <a:t>CRAB</a:t>
+                      </a:r>
+                    </a:p>
+                  </a:txBody>
+                  <a:tcPr/>
+                </a:tc>
+                <a:tc>
+                  <a:txBody>
+                    <a:bodyPr/>
+                    <a:lstStyle/>
+                    <a:p>
+                      <a:r>
+                        <a:rPr lang="en-GB" sz="1400" dirty="0"/>
+                        <a:t>63</a:t>
+                      </a:r>
+                    </a:p>
+                  </a:txBody>
+                  <a:tcPr/>
+                </a:tc>
+                <a:tc>
+                  <a:txBody>
+                    <a:bodyPr/>
+                    <a:lstStyle/>
+                    <a:p>
+                      <a:r>
+                        <a:rPr lang="en-GB" sz="1400" dirty="0"/>
+                        <a:t>11021</a:t>
+                      </a:r>
+                    </a:p>
+                  </a:txBody>
+                  <a:tcPr/>
+                </a:tc>
+                <a:tc>
+                  <a:txBody>
+                    <a:bodyPr/>
+                    <a:lstStyle/>
+                    <a:p>
+                      <a:r>
+                        <a:rPr lang="en-GB" sz="1400" dirty="0"/>
+                        <a:t>52120</a:t>
+                      </a:r>
+                    </a:p>
+                  </a:txBody>
+                  <a:tcPr/>
+                </a:tc>
+                <a:tc>
+                  <a:txBody>
+                    <a:bodyPr/>
+                    <a:lstStyle/>
+                    <a:p>
+                      <a:r>
+                        <a:rPr lang="en-GB" sz="1400" dirty="0"/>
+                        <a:t>63141</a:t>
+                      </a:r>
+                    </a:p>
+                  </a:txBody>
+                  <a:tcPr/>
+                </a:tc>
+                <a:extLst>
+                  <a:ext uri="{0D108BD9-81ED-4DB2-BD59-A6C34878D82A}">
+                    <a16:rowId xmlns:a16="http://schemas.microsoft.com/office/drawing/2014/main" val="980823171"/>
+                  </a:ext>
+                </a:extLst>
+              </a:tr>
+              <a:tr h="331893">
+                <a:tc>
+                  <a:txBody>
+                    <a:bodyPr/>
+                    <a:lstStyle/>
+                    <a:p>
+                      <a:r>
+                        <a:rPr lang="en-GB" sz="1400" dirty="0"/>
+                        <a:t>CZB</a:t>
+                      </a:r>
+                    </a:p>
+                  </a:txBody>
+                  <a:tcPr/>
+                </a:tc>
+                <a:tc>
+                  <a:txBody>
+                    <a:bodyPr/>
+                    <a:lstStyle/>
+                    <a:p>
+                      <a:r>
+                        <a:rPr lang="en-GB" sz="1400" dirty="0"/>
+                        <a:t>WAVE L</a:t>
+                      </a:r>
+                    </a:p>
+                  </a:txBody>
+                  <a:tcPr/>
+                </a:tc>
+                <a:tc>
+                  <a:txBody>
+                    <a:bodyPr/>
+                    <a:lstStyle/>
+                    <a:p>
+                      <a:r>
+                        <a:rPr lang="en-GB" sz="1400" dirty="0"/>
+                        <a:t>58</a:t>
+                      </a:r>
+                    </a:p>
+                  </a:txBody>
+                  <a:tcPr/>
+                </a:tc>
+                <a:tc>
+                  <a:txBody>
+                    <a:bodyPr/>
+                    <a:lstStyle/>
+                    <a:p>
+                      <a:r>
+                        <a:rPr lang="en-GB" sz="1400" dirty="0"/>
+                        <a:t>10969</a:t>
+                      </a:r>
+                    </a:p>
+                  </a:txBody>
+                  <a:tcPr/>
+                </a:tc>
+                <a:tc>
+                  <a:txBody>
+                    <a:bodyPr/>
+                    <a:lstStyle/>
+                    <a:p>
+                      <a:r>
+                        <a:rPr lang="en-GB" sz="1400" dirty="0"/>
+                        <a:t>51690</a:t>
+                      </a:r>
+                    </a:p>
+                  </a:txBody>
+                  <a:tcPr/>
+                </a:tc>
+                <a:tc>
+                  <a:txBody>
+                    <a:bodyPr/>
+                    <a:lstStyle/>
+                    <a:p>
+                      <a:r>
+                        <a:rPr lang="en-GB" sz="1400" dirty="0"/>
+                        <a:t>62659</a:t>
+                      </a:r>
+                    </a:p>
+                  </a:txBody>
+                  <a:tcPr/>
+                </a:tc>
+                <a:extLst>
+                  <a:ext uri="{0D108BD9-81ED-4DB2-BD59-A6C34878D82A}">
+                    <a16:rowId xmlns:a16="http://schemas.microsoft.com/office/drawing/2014/main" val="3233287661"/>
+                  </a:ext>
+                </a:extLst>
+              </a:tr>
+              <a:tr h="331893">
+                <a:tc>
+                  <a:txBody>
+                    <a:bodyPr/>
+                    <a:lstStyle/>
+                    <a:p>
+                      <a:r>
+                        <a:rPr lang="en-GB" sz="1400" dirty="0"/>
+                        <a:t>CZB</a:t>
+                      </a:r>
+                    </a:p>
+                  </a:txBody>
+                  <a:tcPr/>
+                </a:tc>
+                <a:tc>
+                  <a:txBody>
+                    <a:bodyPr/>
+                    <a:lstStyle/>
+                    <a:p>
+                      <a:r>
+                        <a:rPr lang="en-GB" sz="1400" dirty="0"/>
+                        <a:t>WAVE R</a:t>
+                      </a:r>
+                    </a:p>
+                  </a:txBody>
+                  <a:tcPr/>
+                </a:tc>
+                <a:tc>
+                  <a:txBody>
+                    <a:bodyPr/>
+                    <a:lstStyle/>
+                    <a:p>
+                      <a:r>
+                        <a:rPr lang="en-GB" sz="1400" dirty="0"/>
+                        <a:t>44</a:t>
+                      </a:r>
+                    </a:p>
+                  </a:txBody>
+                  <a:tcPr/>
+                </a:tc>
+                <a:tc>
+                  <a:txBody>
+                    <a:bodyPr/>
+                    <a:lstStyle/>
+                    <a:p>
+                      <a:r>
+                        <a:rPr lang="en-GB" sz="1400" dirty="0"/>
+                        <a:t>11611</a:t>
+                      </a:r>
+                    </a:p>
+                  </a:txBody>
+                  <a:tcPr/>
+                </a:tc>
+                <a:tc>
+                  <a:txBody>
+                    <a:bodyPr/>
+                    <a:lstStyle/>
+                    <a:p>
+                      <a:r>
+                        <a:rPr lang="en-GB" sz="1400" dirty="0"/>
+                        <a:t>54820</a:t>
+                      </a:r>
+                    </a:p>
+                  </a:txBody>
+                  <a:tcPr/>
+                </a:tc>
+                <a:tc>
+                  <a:txBody>
+                    <a:bodyPr/>
+                    <a:lstStyle/>
+                    <a:p>
+                      <a:r>
+                        <a:rPr lang="en-GB" sz="1400" dirty="0"/>
+                        <a:t>66431</a:t>
+                      </a:r>
+                    </a:p>
+                  </a:txBody>
+                  <a:tcPr/>
+                </a:tc>
+                <a:extLst>
+                  <a:ext uri="{0D108BD9-81ED-4DB2-BD59-A6C34878D82A}">
+                    <a16:rowId xmlns:a16="http://schemas.microsoft.com/office/drawing/2014/main" val="856716825"/>
+                  </a:ext>
+                </a:extLst>
+              </a:tr>
+              <a:tr h="331893">
+                <a:tc>
+                  <a:txBody>
+                    <a:bodyPr/>
+                    <a:lstStyle/>
+                    <a:p>
+                      <a:r>
+                        <a:rPr lang="en-GB" sz="1400" dirty="0"/>
+                        <a:t>CZD</a:t>
+                      </a:r>
+                    </a:p>
+                  </a:txBody>
+                  <a:tcPr/>
+                </a:tc>
+                <a:tc>
+                  <a:txBody>
+                    <a:bodyPr/>
+                    <a:lstStyle/>
+                    <a:p>
+                      <a:r>
+                        <a:rPr lang="en-GB" sz="1400" dirty="0"/>
+                        <a:t>CRAB</a:t>
+                      </a:r>
+                    </a:p>
+                  </a:txBody>
+                  <a:tcPr/>
+                </a:tc>
+                <a:tc>
+                  <a:txBody>
+                    <a:bodyPr/>
+                    <a:lstStyle/>
+                    <a:p>
+                      <a:r>
+                        <a:rPr lang="en-GB" sz="1400" dirty="0"/>
+                        <a:t>66</a:t>
+                      </a:r>
+                    </a:p>
+                  </a:txBody>
+                  <a:tcPr/>
+                </a:tc>
+                <a:tc>
+                  <a:txBody>
+                    <a:bodyPr/>
+                    <a:lstStyle/>
+                    <a:p>
+                      <a:r>
+                        <a:rPr lang="en-GB" sz="1400" dirty="0"/>
+                        <a:t>11066</a:t>
+                      </a:r>
+                    </a:p>
+                  </a:txBody>
+                  <a:tcPr/>
+                </a:tc>
+                <a:tc>
+                  <a:txBody>
+                    <a:bodyPr/>
+                    <a:lstStyle/>
+                    <a:p>
+                      <a:r>
+                        <a:rPr lang="en-GB" sz="1400" dirty="0"/>
+                        <a:t>52425</a:t>
+                      </a:r>
+                    </a:p>
+                  </a:txBody>
+                  <a:tcPr/>
+                </a:tc>
+                <a:tc>
+                  <a:txBody>
+                    <a:bodyPr/>
+                    <a:lstStyle/>
+                    <a:p>
+                      <a:r>
+                        <a:rPr lang="en-GB" sz="1400" dirty="0"/>
+                        <a:t>63491</a:t>
+                      </a:r>
+                    </a:p>
+                  </a:txBody>
+                  <a:tcPr/>
+                </a:tc>
+                <a:extLst>
+                  <a:ext uri="{0D108BD9-81ED-4DB2-BD59-A6C34878D82A}">
+                    <a16:rowId xmlns:a16="http://schemas.microsoft.com/office/drawing/2014/main" val="3665707619"/>
+                  </a:ext>
+                </a:extLst>
+              </a:tr>
+              <a:tr h="331893">
+                <a:tc>
+                  <a:txBody>
+                    <a:bodyPr/>
+                    <a:lstStyle/>
+                    <a:p>
+                      <a:r>
+                        <a:rPr lang="en-GB" sz="1400" dirty="0"/>
+                        <a:t>CZD</a:t>
+                      </a:r>
+                    </a:p>
+                  </a:txBody>
+                  <a:tcPr/>
+                </a:tc>
+                <a:tc>
+                  <a:txBody>
+                    <a:bodyPr/>
+                    <a:lstStyle/>
+                    <a:p>
+                      <a:r>
+                        <a:rPr lang="en-GB" sz="1400" dirty="0"/>
+                        <a:t>WAVE L</a:t>
+                      </a:r>
+                    </a:p>
+                  </a:txBody>
+                  <a:tcPr/>
+                </a:tc>
+                <a:tc>
+                  <a:txBody>
+                    <a:bodyPr/>
+                    <a:lstStyle/>
+                    <a:p>
+                      <a:r>
+                        <a:rPr lang="en-GB" sz="1400" dirty="0"/>
+                        <a:t>30</a:t>
+                      </a:r>
+                    </a:p>
+                  </a:txBody>
+                  <a:tcPr/>
+                </a:tc>
+                <a:tc>
+                  <a:txBody>
+                    <a:bodyPr/>
+                    <a:lstStyle/>
+                    <a:p>
+                      <a:r>
+                        <a:rPr lang="en-GB" sz="1400" dirty="0"/>
+                        <a:t>12327</a:t>
+                      </a:r>
+                    </a:p>
+                  </a:txBody>
+                  <a:tcPr/>
+                </a:tc>
+                <a:tc>
+                  <a:txBody>
+                    <a:bodyPr/>
+                    <a:lstStyle/>
+                    <a:p>
+                      <a:r>
+                        <a:rPr lang="en-GB" sz="1400" dirty="0"/>
+                        <a:t>58256</a:t>
+                      </a:r>
+                    </a:p>
+                  </a:txBody>
+                  <a:tcPr/>
+                </a:tc>
+                <a:tc>
+                  <a:txBody>
+                    <a:bodyPr/>
+                    <a:lstStyle/>
+                    <a:p>
+                      <a:r>
+                        <a:rPr lang="en-GB" sz="1400" dirty="0"/>
+                        <a:t>70583</a:t>
+                      </a:r>
+                    </a:p>
+                  </a:txBody>
+                  <a:tcPr/>
+                </a:tc>
+                <a:extLst>
+                  <a:ext uri="{0D108BD9-81ED-4DB2-BD59-A6C34878D82A}">
+                    <a16:rowId xmlns:a16="http://schemas.microsoft.com/office/drawing/2014/main" val="4055182826"/>
+                  </a:ext>
+                </a:extLst>
+              </a:tr>
+              <a:tr h="331893">
+                <a:tc>
+                  <a:txBody>
+                    <a:bodyPr/>
+                    <a:lstStyle/>
+                    <a:p>
+                      <a:r>
+                        <a:rPr lang="en-GB" sz="1400" dirty="0"/>
+                        <a:t>CZD</a:t>
+                      </a:r>
+                    </a:p>
+                  </a:txBody>
+                  <a:tcPr/>
+                </a:tc>
+                <a:tc>
+                  <a:txBody>
+                    <a:bodyPr/>
+                    <a:lstStyle/>
+                    <a:p>
+                      <a:r>
+                        <a:rPr lang="en-GB" sz="1400" dirty="0"/>
+                        <a:t>WAVE R</a:t>
+                      </a:r>
+                    </a:p>
+                  </a:txBody>
+                  <a:tcPr/>
+                </a:tc>
+                <a:tc>
+                  <a:txBody>
+                    <a:bodyPr/>
+                    <a:lstStyle/>
+                    <a:p>
+                      <a:r>
+                        <a:rPr lang="en-GB" sz="1400" dirty="0"/>
+                        <a:t>72</a:t>
+                      </a:r>
+                    </a:p>
+                  </a:txBody>
+                  <a:tcPr/>
+                </a:tc>
+                <a:tc>
+                  <a:txBody>
+                    <a:bodyPr/>
+                    <a:lstStyle/>
+                    <a:p>
+                      <a:r>
+                        <a:rPr lang="en-GB" sz="1400" dirty="0"/>
+                        <a:t>10993</a:t>
+                      </a:r>
+                    </a:p>
+                  </a:txBody>
+                  <a:tcPr/>
+                </a:tc>
+                <a:tc>
+                  <a:txBody>
+                    <a:bodyPr/>
+                    <a:lstStyle/>
+                    <a:p>
+                      <a:r>
+                        <a:rPr lang="en-GB" sz="1400" dirty="0"/>
+                        <a:t>52283</a:t>
+                      </a:r>
+                    </a:p>
+                  </a:txBody>
+                  <a:tcPr/>
+                </a:tc>
+                <a:tc>
+                  <a:txBody>
+                    <a:bodyPr/>
+                    <a:lstStyle/>
+                    <a:p>
+                      <a:r>
+                        <a:rPr lang="en-GB" sz="1400" dirty="0"/>
+                        <a:t>63276</a:t>
+                      </a:r>
+                    </a:p>
+                  </a:txBody>
+                  <a:tcPr/>
+                </a:tc>
+                <a:extLst>
+                  <a:ext uri="{0D108BD9-81ED-4DB2-BD59-A6C34878D82A}">
+                    <a16:rowId xmlns:a16="http://schemas.microsoft.com/office/drawing/2014/main" val="2443884119"/>
+                  </a:ext>
+                </a:extLst>
+              </a:tr>
+            </a:tbl>
+          </a:graphicData>
+        </a:graphic>
+      </p:graphicFrame>
     </p:spTree>
     <p:extLst>
       <p:ext uri="{BB962C8B-B14F-4D97-AF65-F5344CB8AC3E}">
-        <p14:creationId xmlns:p14="http://schemas.microsoft.com/office/powerpoint/2010/main" val="2887222785"/>
+        <p14:creationId xmlns:p14="http://schemas.microsoft.com/office/powerpoint/2010/main" val="523456648"/>
       </p:ext>
     </p:extLst>
   </p:cSld>
@@ -8754,6 +10659,36 @@
           <a:chExt cx="0" cy="0"/>
         </a:xfrm>
       </p:grpSpPr>
+      <p:pic>
+        <p:nvPicPr>
+          <p:cNvPr id="3" name="Picture 2">
+            <a:extLst>
+              <a:ext uri="{FF2B5EF4-FFF2-40B4-BE49-F238E27FC236}">
+                <a16:creationId xmlns:a16="http://schemas.microsoft.com/office/drawing/2014/main" id="{26DFFBE7-C31F-ED49-8BC9-06868F077F86}"/>
+              </a:ext>
+            </a:extLst>
+          </p:cNvPr>
+          <p:cNvPicPr>
+            <a:picLocks noChangeAspect="1"/>
+          </p:cNvPicPr>
+          <p:nvPr/>
+        </p:nvPicPr>
+        <p:blipFill>
+          <a:blip r:embed="rId2"/>
+          <a:stretch>
+            <a:fillRect/>
+          </a:stretch>
+        </p:blipFill>
+        <p:spPr>
+          <a:xfrm>
+            <a:off x="4571999" y="0"/>
+            <a:ext cx="7620000" cy="6858000"/>
+          </a:xfrm>
+          <a:prstGeom prst="rect">
+            <a:avLst/>
+          </a:prstGeom>
+        </p:spPr>
+      </p:pic>
       <p:sp>
         <p:nvSpPr>
           <p:cNvPr id="5" name="TextBox 4">
@@ -8854,7 +10789,7 @@
         <p:spPr>
           <a:xfrm>
             <a:off x="462801" y="2188649"/>
-            <a:ext cx="4043885" cy="369332"/>
+            <a:ext cx="4043885" cy="1754326"/>
           </a:xfrm>
           <a:prstGeom prst="rect">
             <a:avLst/>
@@ -8873,123 +10808,20 @@
             </a:pPr>
             <a:r>
               <a:rPr lang="en-GB" dirty="0"/>
-              <a:t>Kept only variants outside inversions</a:t>
-            </a:r>
-          </a:p>
-        </p:txBody>
-      </p:sp>
-      <p:pic>
-        <p:nvPicPr>
-          <p:cNvPr id="3" name="Picture 2">
-            <a:extLst>
-              <a:ext uri="{FF2B5EF4-FFF2-40B4-BE49-F238E27FC236}">
-                <a16:creationId xmlns:a16="http://schemas.microsoft.com/office/drawing/2014/main" id="{2972DBAF-E2C0-CD49-B069-67B39BB30C77}"/>
-              </a:ext>
-            </a:extLst>
-          </p:cNvPr>
-          <p:cNvPicPr>
-            <a:picLocks noChangeAspect="1"/>
-          </p:cNvPicPr>
-          <p:nvPr/>
-        </p:nvPicPr>
-        <p:blipFill>
-          <a:blip r:embed="rId2"/>
-          <a:stretch>
-            <a:fillRect/>
-          </a:stretch>
-        </p:blipFill>
-        <p:spPr>
-          <a:xfrm>
-            <a:off x="4713514" y="0"/>
-            <a:ext cx="7478486" cy="6858000"/>
-          </a:xfrm>
-          <a:prstGeom prst="rect">
-            <a:avLst/>
-          </a:prstGeom>
-        </p:spPr>
-      </p:pic>
-      <p:sp>
-        <p:nvSpPr>
-          <p:cNvPr id="7" name="TextBox 6">
-            <a:extLst>
-              <a:ext uri="{FF2B5EF4-FFF2-40B4-BE49-F238E27FC236}">
-                <a16:creationId xmlns:a16="http://schemas.microsoft.com/office/drawing/2014/main" id="{F20C078E-D3A6-6B43-99C0-8F4EE667D440}"/>
-              </a:ext>
-            </a:extLst>
-          </p:cNvPr>
-          <p:cNvSpPr txBox="1"/>
-          <p:nvPr/>
-        </p:nvSpPr>
-        <p:spPr>
-          <a:xfrm>
-            <a:off x="528114" y="3000221"/>
-            <a:ext cx="4043885" cy="2308324"/>
-          </a:xfrm>
-          <a:prstGeom prst="rect">
-            <a:avLst/>
-          </a:prstGeom>
-          <a:noFill/>
-        </p:spPr>
-        <p:txBody>
-          <a:bodyPr wrap="square" rtlCol="0">
-            <a:spAutoFit/>
-          </a:bodyPr>
-          <a:lstStyle/>
-          <a:p>
-            <a:pPr marL="285750" indent="-285750">
-              <a:buFont typeface="Arial" panose="020B0604020202020204" pitchFamily="34" charset="0"/>
-              <a:buChar char="•"/>
-            </a:pPr>
-            <a:r>
-              <a:rPr lang="en-GB" dirty="0"/>
-              <a:t>Two-sample Kolmogorov-Smirnov test</a:t>
-            </a:r>
-            <a:br>
-              <a:rPr lang="en-GB" dirty="0"/>
-            </a:br>
-            <a:r>
-              <a:rPr lang="en-GB" dirty="0"/>
-              <a:t>Null hypothesis:</a:t>
-            </a:r>
-            <a:br>
-              <a:rPr lang="en-GB" dirty="0"/>
-            </a:br>
-            <a:r>
-              <a:rPr lang="en-GB" dirty="0"/>
-              <a:t>INDELs and SNPs </a:t>
-            </a:r>
-            <a:r>
-              <a:rPr lang="en-US" dirty="0"/>
-              <a:t>are drawn from the same continuous distribution</a:t>
+              <a:t>Kept variants inside and outside inversions, present in at least N – 3 individuals. When the sample size of a variant was higher than N – 3, N – 3 individuals/genotypes were </a:t>
+            </a:r>
+            <a:r>
+              <a:rPr lang="en-GB"/>
+              <a:t>randomly sampled.</a:t>
             </a:r>
             <a:endParaRPr lang="en-GB" dirty="0"/>
-          </a:p>
-          <a:p>
-            <a:pPr marL="742950" lvl="1" indent="-285750">
-              <a:buFont typeface="Arial" panose="020B0604020202020204" pitchFamily="34" charset="0"/>
-              <a:buChar char="•"/>
-            </a:pPr>
-            <a:r>
-              <a:rPr lang="en-GB" dirty="0"/>
-              <a:t>Using relative proportions, the null cannot be rejected</a:t>
-            </a:r>
-          </a:p>
-          <a:p>
-            <a:pPr marL="742950" lvl="1" indent="-285750">
-              <a:buFont typeface="Arial" panose="020B0604020202020204" pitchFamily="34" charset="0"/>
-              <a:buChar char="•"/>
-            </a:pPr>
-            <a:r>
-              <a:rPr lang="en-GB" dirty="0"/>
-              <a:t>Using square root counts, the null can be rejected</a:t>
-            </a:r>
           </a:p>
         </p:txBody>
       </p:sp>
     </p:spTree>
     <p:extLst>
       <p:ext uri="{BB962C8B-B14F-4D97-AF65-F5344CB8AC3E}">
-        <p14:creationId xmlns:p14="http://schemas.microsoft.com/office/powerpoint/2010/main" val="3180028549"/>
+        <p14:creationId xmlns:p14="http://schemas.microsoft.com/office/powerpoint/2010/main" val="2887222785"/>
       </p:ext>
     </p:extLst>
   </p:cSld>

</xml_diff>